<commit_message>
:speech_balloon: Update error control keyword
</commit_message>
<xml_diff>
--- a/18/yongki/FlowControl&ErrorControl.pptx
+++ b/18/yongki/FlowControl&ErrorControl.pptx
@@ -5,27 +5,28 @@
     <p:sldMasterId id="2147483648" r:id="rId1"/>
   </p:sldMasterIdLst>
   <p:notesMasterIdLst>
-    <p:notesMasterId r:id="rId20"/>
+    <p:notesMasterId r:id="rId21"/>
   </p:notesMasterIdLst>
   <p:sldIdLst>
     <p:sldId id="256" r:id="rId2"/>
     <p:sldId id="257" r:id="rId3"/>
-    <p:sldId id="314" r:id="rId4"/>
+    <p:sldId id="349" r:id="rId4"/>
     <p:sldId id="339" r:id="rId5"/>
     <p:sldId id="290" r:id="rId6"/>
     <p:sldId id="340" r:id="rId7"/>
     <p:sldId id="341" r:id="rId8"/>
-    <p:sldId id="342" r:id="rId9"/>
-    <p:sldId id="333" r:id="rId10"/>
-    <p:sldId id="343" r:id="rId11"/>
-    <p:sldId id="344" r:id="rId12"/>
-    <p:sldId id="326" r:id="rId13"/>
-    <p:sldId id="332" r:id="rId14"/>
-    <p:sldId id="345" r:id="rId15"/>
-    <p:sldId id="346" r:id="rId16"/>
-    <p:sldId id="348" r:id="rId17"/>
-    <p:sldId id="347" r:id="rId18"/>
-    <p:sldId id="301" r:id="rId19"/>
+    <p:sldId id="350" r:id="rId9"/>
+    <p:sldId id="342" r:id="rId10"/>
+    <p:sldId id="333" r:id="rId11"/>
+    <p:sldId id="343" r:id="rId12"/>
+    <p:sldId id="344" r:id="rId13"/>
+    <p:sldId id="326" r:id="rId14"/>
+    <p:sldId id="332" r:id="rId15"/>
+    <p:sldId id="345" r:id="rId16"/>
+    <p:sldId id="346" r:id="rId17"/>
+    <p:sldId id="348" r:id="rId18"/>
+    <p:sldId id="347" r:id="rId19"/>
+    <p:sldId id="301" r:id="rId20"/>
   </p:sldIdLst>
   <p:sldSz cx="9144000" cy="6858000" type="screen4x3"/>
   <p:notesSz cx="6858000" cy="9144000"/>
@@ -255,7 +256,7 @@
           <a:p>
             <a:fld id="{278A5395-7299-4714-9E5C-8983F2B9A6E7}" type="datetimeFigureOut">
               <a:rPr lang="ko-KR" altLang="en-US" smtClean="0"/>
-              <a:t>2022-05-10</a:t>
+              <a:t>2022-05-13</a:t>
             </a:fld>
             <a:endParaRPr lang="ko-KR" altLang="en-US"/>
           </a:p>
@@ -4630,6 +4631,1263 @@
 </file>
 
 <file path=ppt/slides/slide10.xml><?xml version="1.0" encoding="utf-8"?>
+<p:sld xmlns:a="http://schemas.openxmlformats.org/drawingml/2006/main" xmlns:r="http://schemas.openxmlformats.org/officeDocument/2006/relationships" xmlns:p="http://schemas.openxmlformats.org/presentationml/2006/main">
+  <p:cSld>
+    <p:spTree>
+      <p:nvGrpSpPr>
+        <p:cNvPr id="1" name=""/>
+        <p:cNvGrpSpPr/>
+        <p:nvPr/>
+      </p:nvGrpSpPr>
+      <p:grpSpPr>
+        <a:xfrm>
+          <a:off x="0" y="0"/>
+          <a:ext cx="0" cy="0"/>
+          <a:chOff x="0" y="0"/>
+          <a:chExt cx="0" cy="0"/>
+        </a:xfrm>
+      </p:grpSpPr>
+      <p:sp>
+        <p:nvSpPr>
+          <p:cNvPr id="5122" name="Rectangle 2">
+            <a:extLst>
+              <a:ext uri="{FF2B5EF4-FFF2-40B4-BE49-F238E27FC236}">
+                <a16:creationId xmlns:a16="http://schemas.microsoft.com/office/drawing/2014/main" id="{5A5441BC-21C9-4C4E-8617-73A39EC832C7}"/>
+              </a:ext>
+            </a:extLst>
+          </p:cNvPr>
+          <p:cNvSpPr>
+            <a:spLocks noGrp="1" noChangeArrowheads="1"/>
+          </p:cNvSpPr>
+          <p:nvPr>
+            <p:ph type="title"/>
+          </p:nvPr>
+        </p:nvSpPr>
+        <p:spPr>
+          <a:xfrm>
+            <a:off x="457200" y="188913"/>
+            <a:ext cx="8229600" cy="1295400"/>
+          </a:xfrm>
+        </p:spPr>
+        <p:txBody>
+          <a:bodyPr/>
+          <a:lstStyle/>
+          <a:p>
+            <a:pPr algn="l" eaLnBrk="1" hangingPunct="1">
+              <a:defRPr/>
+            </a:pPr>
+            <a:r>
+              <a:rPr lang="ko-KR" altLang="en-US" sz="3200">
+                <a:solidFill>
+                  <a:schemeClr val="tx1"/>
+                </a:solidFill>
+              </a:rPr>
+              <a:t>파이프라인 오류 회복</a:t>
+            </a:r>
+            <a:endParaRPr lang="ko-KR" altLang="ko-KR" sz="2000">
+              <a:solidFill>
+                <a:schemeClr val="tx1"/>
+              </a:solidFill>
+            </a:endParaRPr>
+          </a:p>
+        </p:txBody>
+      </p:sp>
+      <p:cxnSp>
+        <p:nvCxnSpPr>
+          <p:cNvPr id="3" name="직선 연결선 2">
+            <a:extLst>
+              <a:ext uri="{FF2B5EF4-FFF2-40B4-BE49-F238E27FC236}">
+                <a16:creationId xmlns:a16="http://schemas.microsoft.com/office/drawing/2014/main" id="{00016A16-78F9-4CDB-B5A3-E7D1D56285D2}"/>
+              </a:ext>
+            </a:extLst>
+          </p:cNvPr>
+          <p:cNvCxnSpPr/>
+          <p:nvPr/>
+        </p:nvCxnSpPr>
+        <p:spPr bwMode="auto">
+          <a:xfrm>
+            <a:off x="575556" y="1268760"/>
+            <a:ext cx="7992888" cy="0"/>
+          </a:xfrm>
+          <a:prstGeom prst="line">
+            <a:avLst/>
+          </a:prstGeom>
+          <a:solidFill>
+            <a:schemeClr val="accent1"/>
+          </a:solidFill>
+          <a:ln w="25400" cap="flat" cmpd="sng" algn="ctr">
+            <a:solidFill>
+              <a:schemeClr val="tx1"/>
+            </a:solidFill>
+            <a:prstDash val="solid"/>
+            <a:round/>
+            <a:headEnd type="none" w="med" len="med"/>
+            <a:tailEnd type="none" w="med" len="med"/>
+          </a:ln>
+          <a:effectLst/>
+          <a:extLst>
+            <a:ext uri="{AF507438-7753-43E0-B8FC-AC1667EBCBE1}">
+              <a14:hiddenEffects xmlns:a14="http://schemas.microsoft.com/office/drawing/2010/main">
+                <a:effectLst>
+                  <a:outerShdw dist="35921" dir="2700000" algn="ctr" rotWithShape="0">
+                    <a:schemeClr val="bg2"/>
+                  </a:outerShdw>
+                </a:effectLst>
+              </a14:hiddenEffects>
+            </a:ext>
+          </a:extLst>
+        </p:spPr>
+      </p:cxnSp>
+      <p:graphicFrame>
+        <p:nvGraphicFramePr>
+          <p:cNvPr id="6" name="표 5">
+            <a:extLst>
+              <a:ext uri="{FF2B5EF4-FFF2-40B4-BE49-F238E27FC236}">
+                <a16:creationId xmlns:a16="http://schemas.microsoft.com/office/drawing/2014/main" id="{90B15DFD-83BF-4B89-9642-B09B029F1A94}"/>
+              </a:ext>
+            </a:extLst>
+          </p:cNvPr>
+          <p:cNvGraphicFramePr>
+            <a:graphicFrameLocks noGrp="1"/>
+          </p:cNvGraphicFramePr>
+          <p:nvPr>
+            <p:extLst>
+              <p:ext uri="{D42A27DB-BD31-4B8C-83A1-F6EECF244321}">
+                <p14:modId xmlns:p14="http://schemas.microsoft.com/office/powerpoint/2010/main" val="3733306006"/>
+              </p:ext>
+            </p:extLst>
+          </p:nvPr>
+        </p:nvGraphicFramePr>
+        <p:xfrm>
+          <a:off x="143508" y="1412777"/>
+          <a:ext cx="8856984" cy="3937000"/>
+        </p:xfrm>
+        <a:graphic>
+          <a:graphicData uri="http://schemas.openxmlformats.org/drawingml/2006/table">
+            <a:tbl>
+              <a:tblPr firstRow="1" bandRow="1">
+                <a:tableStyleId>{5C22544A-7EE6-4342-B048-85BDC9FD1C3A}</a:tableStyleId>
+              </a:tblPr>
+              <a:tblGrid>
+                <a:gridCol w="720080">
+                  <a:extLst>
+                    <a:ext uri="{9D8B030D-6E8A-4147-A177-3AD203B41FA5}">
+                      <a16:colId xmlns:a16="http://schemas.microsoft.com/office/drawing/2014/main" val="1315739539"/>
+                    </a:ext>
+                  </a:extLst>
+                </a:gridCol>
+                <a:gridCol w="4068452">
+                  <a:extLst>
+                    <a:ext uri="{9D8B030D-6E8A-4147-A177-3AD203B41FA5}">
+                      <a16:colId xmlns:a16="http://schemas.microsoft.com/office/drawing/2014/main" val="819310429"/>
+                    </a:ext>
+                  </a:extLst>
+                </a:gridCol>
+                <a:gridCol w="4068452">
+                  <a:extLst>
+                    <a:ext uri="{9D8B030D-6E8A-4147-A177-3AD203B41FA5}">
+                      <a16:colId xmlns:a16="http://schemas.microsoft.com/office/drawing/2014/main" val="3254816515"/>
+                    </a:ext>
+                  </a:extLst>
+                </a:gridCol>
+              </a:tblGrid>
+              <a:tr h="370840">
+                <a:tc>
+                  <a:txBody>
+                    <a:bodyPr/>
+                    <a:lstStyle/>
+                    <a:p>
+                      <a:pPr latinLnBrk="1"/>
+                      <a:endParaRPr lang="ko-KR" altLang="en-US">
+                        <a:solidFill>
+                          <a:schemeClr val="tx1"/>
+                        </a:solidFill>
+                      </a:endParaRPr>
+                    </a:p>
+                  </a:txBody>
+                  <a:tcPr>
+                    <a:lnL w="12700" cap="flat" cmpd="sng" algn="ctr">
+                      <a:solidFill>
+                        <a:schemeClr val="tx1"/>
+                      </a:solidFill>
+                      <a:prstDash val="solid"/>
+                      <a:round/>
+                      <a:headEnd type="none" w="med" len="med"/>
+                      <a:tailEnd type="none" w="med" len="med"/>
+                    </a:lnL>
+                    <a:lnR w="12700" cap="flat" cmpd="sng" algn="ctr">
+                      <a:solidFill>
+                        <a:schemeClr val="tx1"/>
+                      </a:solidFill>
+                      <a:prstDash val="solid"/>
+                      <a:round/>
+                      <a:headEnd type="none" w="med" len="med"/>
+                      <a:tailEnd type="none" w="med" len="med"/>
+                    </a:lnR>
+                    <a:lnT w="12700" cap="flat" cmpd="sng" algn="ctr">
+                      <a:solidFill>
+                        <a:schemeClr val="tx1"/>
+                      </a:solidFill>
+                      <a:prstDash val="solid"/>
+                      <a:round/>
+                      <a:headEnd type="none" w="med" len="med"/>
+                      <a:tailEnd type="none" w="med" len="med"/>
+                    </a:lnT>
+                    <a:lnB w="12700" cap="flat" cmpd="sng" algn="ctr">
+                      <a:solidFill>
+                        <a:schemeClr val="tx1"/>
+                      </a:solidFill>
+                      <a:prstDash val="solid"/>
+                      <a:round/>
+                      <a:headEnd type="none" w="med" len="med"/>
+                      <a:tailEnd type="none" w="med" len="med"/>
+                    </a:lnB>
+                    <a:noFill/>
+                  </a:tcPr>
+                </a:tc>
+                <a:tc>
+                  <a:txBody>
+                    <a:bodyPr/>
+                    <a:lstStyle/>
+                    <a:p>
+                      <a:pPr latinLnBrk="1"/>
+                      <a:r>
+                        <a:rPr lang="en-US" altLang="ko-KR">
+                          <a:solidFill>
+                            <a:schemeClr val="tx1"/>
+                          </a:solidFill>
+                        </a:rPr>
+                        <a:t>Go-Back-n</a:t>
+                      </a:r>
+                      <a:endParaRPr lang="ko-KR" altLang="en-US">
+                        <a:solidFill>
+                          <a:schemeClr val="tx1"/>
+                        </a:solidFill>
+                      </a:endParaRPr>
+                    </a:p>
+                  </a:txBody>
+                  <a:tcPr>
+                    <a:lnL w="12700" cap="flat" cmpd="sng" algn="ctr">
+                      <a:solidFill>
+                        <a:schemeClr val="tx1"/>
+                      </a:solidFill>
+                      <a:prstDash val="solid"/>
+                      <a:round/>
+                      <a:headEnd type="none" w="med" len="med"/>
+                      <a:tailEnd type="none" w="med" len="med"/>
+                    </a:lnL>
+                    <a:lnR w="12700" cap="flat" cmpd="sng" algn="ctr">
+                      <a:solidFill>
+                        <a:schemeClr val="tx1"/>
+                      </a:solidFill>
+                      <a:prstDash val="solid"/>
+                      <a:round/>
+                      <a:headEnd type="none" w="med" len="med"/>
+                      <a:tailEnd type="none" w="med" len="med"/>
+                    </a:lnR>
+                    <a:lnT w="12700" cap="flat" cmpd="sng" algn="ctr">
+                      <a:solidFill>
+                        <a:schemeClr val="tx1"/>
+                      </a:solidFill>
+                      <a:prstDash val="solid"/>
+                      <a:round/>
+                      <a:headEnd type="none" w="med" len="med"/>
+                      <a:tailEnd type="none" w="med" len="med"/>
+                    </a:lnT>
+                    <a:lnB w="12700" cap="flat" cmpd="sng" algn="ctr">
+                      <a:solidFill>
+                        <a:schemeClr val="tx1"/>
+                      </a:solidFill>
+                      <a:prstDash val="solid"/>
+                      <a:round/>
+                      <a:headEnd type="none" w="med" len="med"/>
+                      <a:tailEnd type="none" w="med" len="med"/>
+                    </a:lnB>
+                    <a:noFill/>
+                  </a:tcPr>
+                </a:tc>
+                <a:tc>
+                  <a:txBody>
+                    <a:bodyPr/>
+                    <a:lstStyle/>
+                    <a:p>
+                      <a:pPr latinLnBrk="1"/>
+                      <a:r>
+                        <a:rPr lang="en-US" altLang="ko-KR">
+                          <a:solidFill>
+                            <a:schemeClr val="tx1"/>
+                          </a:solidFill>
+                        </a:rPr>
+                        <a:t>Selective Repeat</a:t>
+                      </a:r>
+                      <a:endParaRPr lang="ko-KR" altLang="en-US">
+                        <a:solidFill>
+                          <a:schemeClr val="tx1"/>
+                        </a:solidFill>
+                      </a:endParaRPr>
+                    </a:p>
+                  </a:txBody>
+                  <a:tcPr>
+                    <a:lnL w="12700" cap="flat" cmpd="sng" algn="ctr">
+                      <a:solidFill>
+                        <a:schemeClr val="tx1"/>
+                      </a:solidFill>
+                      <a:prstDash val="solid"/>
+                      <a:round/>
+                      <a:headEnd type="none" w="med" len="med"/>
+                      <a:tailEnd type="none" w="med" len="med"/>
+                    </a:lnL>
+                    <a:lnR w="12700" cap="flat" cmpd="sng" algn="ctr">
+                      <a:solidFill>
+                        <a:schemeClr val="tx1"/>
+                      </a:solidFill>
+                      <a:prstDash val="solid"/>
+                      <a:round/>
+                      <a:headEnd type="none" w="med" len="med"/>
+                      <a:tailEnd type="none" w="med" len="med"/>
+                    </a:lnR>
+                    <a:lnT w="12700" cap="flat" cmpd="sng" algn="ctr">
+                      <a:solidFill>
+                        <a:schemeClr val="tx1"/>
+                      </a:solidFill>
+                      <a:prstDash val="solid"/>
+                      <a:round/>
+                      <a:headEnd type="none" w="med" len="med"/>
+                      <a:tailEnd type="none" w="med" len="med"/>
+                    </a:lnT>
+                    <a:lnB w="12700" cap="flat" cmpd="sng" algn="ctr">
+                      <a:solidFill>
+                        <a:schemeClr val="tx1"/>
+                      </a:solidFill>
+                      <a:prstDash val="solid"/>
+                      <a:round/>
+                      <a:headEnd type="none" w="med" len="med"/>
+                      <a:tailEnd type="none" w="med" len="med"/>
+                    </a:lnB>
+                    <a:noFill/>
+                  </a:tcPr>
+                </a:tc>
+                <a:extLst>
+                  <a:ext uri="{0D108BD9-81ED-4DB2-BD59-A6C34878D82A}">
+                    <a16:rowId xmlns:a16="http://schemas.microsoft.com/office/drawing/2014/main" val="3349964729"/>
+                  </a:ext>
+                </a:extLst>
+              </a:tr>
+              <a:tr h="370840">
+                <a:tc>
+                  <a:txBody>
+                    <a:bodyPr/>
+                    <a:lstStyle/>
+                    <a:p>
+                      <a:pPr latinLnBrk="1"/>
+                      <a:r>
+                        <a:rPr lang="ko-KR" altLang="en-US">
+                          <a:solidFill>
+                            <a:schemeClr val="tx1"/>
+                          </a:solidFill>
+                        </a:rPr>
+                        <a:t>의미</a:t>
+                      </a:r>
+                    </a:p>
+                  </a:txBody>
+                  <a:tcPr anchor="ctr">
+                    <a:lnL w="12700" cap="flat" cmpd="sng" algn="ctr">
+                      <a:solidFill>
+                        <a:schemeClr val="tx1"/>
+                      </a:solidFill>
+                      <a:prstDash val="solid"/>
+                      <a:round/>
+                      <a:headEnd type="none" w="med" len="med"/>
+                      <a:tailEnd type="none" w="med" len="med"/>
+                    </a:lnL>
+                    <a:lnR w="12700" cap="flat" cmpd="sng" algn="ctr">
+                      <a:solidFill>
+                        <a:schemeClr val="tx1"/>
+                      </a:solidFill>
+                      <a:prstDash val="solid"/>
+                      <a:round/>
+                      <a:headEnd type="none" w="med" len="med"/>
+                      <a:tailEnd type="none" w="med" len="med"/>
+                    </a:lnR>
+                    <a:lnT w="12700" cap="flat" cmpd="sng" algn="ctr">
+                      <a:solidFill>
+                        <a:schemeClr val="tx1"/>
+                      </a:solidFill>
+                      <a:prstDash val="solid"/>
+                      <a:round/>
+                      <a:headEnd type="none" w="med" len="med"/>
+                      <a:tailEnd type="none" w="med" len="med"/>
+                    </a:lnT>
+                    <a:lnB w="12700" cap="flat" cmpd="sng" algn="ctr">
+                      <a:solidFill>
+                        <a:schemeClr val="tx1"/>
+                      </a:solidFill>
+                      <a:prstDash val="solid"/>
+                      <a:round/>
+                      <a:headEnd type="none" w="med" len="med"/>
+                      <a:tailEnd type="none" w="med" len="med"/>
+                    </a:lnB>
+                    <a:noFill/>
+                  </a:tcPr>
+                </a:tc>
+                <a:tc>
+                  <a:txBody>
+                    <a:bodyPr/>
+                    <a:lstStyle/>
+                    <a:p>
+                      <a:r>
+                        <a:rPr lang="ko-KR" altLang="en-US" sz="1800" b="0" kern="1200">
+                          <a:solidFill>
+                            <a:schemeClr val="dk1"/>
+                          </a:solidFill>
+                          <a:effectLst/>
+                          <a:latin typeface="+mn-lt"/>
+                          <a:ea typeface="+mn-ea"/>
+                          <a:cs typeface="+mn-cs"/>
+                        </a:rPr>
+                        <a:t>송신자가 손상되거나 손실된 패킷부터 전송한 지점까지 </a:t>
+                      </a:r>
+                      <a:br>
+                        <a:rPr lang="en-US" altLang="ko-KR" sz="1800" b="0" kern="1200">
+                          <a:solidFill>
+                            <a:schemeClr val="dk1"/>
+                          </a:solidFill>
+                          <a:effectLst/>
+                          <a:latin typeface="+mn-lt"/>
+                          <a:ea typeface="+mn-ea"/>
+                          <a:cs typeface="+mn-cs"/>
+                        </a:rPr>
+                      </a:br>
+                      <a:r>
+                        <a:rPr lang="ko-KR" altLang="en-US" sz="1800" b="0" u="sng" kern="1200">
+                          <a:solidFill>
+                            <a:schemeClr val="dk1"/>
+                          </a:solidFill>
+                          <a:effectLst/>
+                          <a:latin typeface="+mn-lt"/>
+                          <a:ea typeface="+mn-ea"/>
+                          <a:cs typeface="+mn-cs"/>
+                        </a:rPr>
+                        <a:t>순서대로 다시 재전송</a:t>
+                      </a:r>
+                      <a:r>
+                        <a:rPr lang="ko-KR" altLang="en-US" sz="1800" b="0" kern="1200">
+                          <a:solidFill>
+                            <a:schemeClr val="dk1"/>
+                          </a:solidFill>
+                          <a:effectLst/>
+                          <a:latin typeface="+mn-lt"/>
+                          <a:ea typeface="+mn-ea"/>
+                          <a:cs typeface="+mn-cs"/>
+                        </a:rPr>
+                        <a:t>하는 기법이다</a:t>
+                      </a:r>
+                      <a:r>
+                        <a:rPr lang="en-US" altLang="ko-KR" sz="1800" b="0" kern="1200">
+                          <a:solidFill>
+                            <a:schemeClr val="dk1"/>
+                          </a:solidFill>
+                          <a:effectLst/>
+                          <a:latin typeface="+mn-lt"/>
+                          <a:ea typeface="+mn-ea"/>
+                          <a:cs typeface="+mn-cs"/>
+                        </a:rPr>
+                        <a:t>.        </a:t>
+                      </a:r>
+                    </a:p>
+                  </a:txBody>
+                  <a:tcPr>
+                    <a:lnL w="12700" cap="flat" cmpd="sng" algn="ctr">
+                      <a:solidFill>
+                        <a:schemeClr val="tx1"/>
+                      </a:solidFill>
+                      <a:prstDash val="solid"/>
+                      <a:round/>
+                      <a:headEnd type="none" w="med" len="med"/>
+                      <a:tailEnd type="none" w="med" len="med"/>
+                    </a:lnL>
+                    <a:lnR w="12700" cap="flat" cmpd="sng" algn="ctr">
+                      <a:solidFill>
+                        <a:schemeClr val="tx1"/>
+                      </a:solidFill>
+                      <a:prstDash val="solid"/>
+                      <a:round/>
+                      <a:headEnd type="none" w="med" len="med"/>
+                      <a:tailEnd type="none" w="med" len="med"/>
+                    </a:lnR>
+                    <a:lnT w="12700" cap="flat" cmpd="sng" algn="ctr">
+                      <a:solidFill>
+                        <a:schemeClr val="tx1"/>
+                      </a:solidFill>
+                      <a:prstDash val="solid"/>
+                      <a:round/>
+                      <a:headEnd type="none" w="med" len="med"/>
+                      <a:tailEnd type="none" w="med" len="med"/>
+                    </a:lnT>
+                    <a:lnB w="12700" cap="flat" cmpd="sng" algn="ctr">
+                      <a:solidFill>
+                        <a:schemeClr val="tx1"/>
+                      </a:solidFill>
+                      <a:prstDash val="solid"/>
+                      <a:round/>
+                      <a:headEnd type="none" w="med" len="med"/>
+                      <a:tailEnd type="none" w="med" len="med"/>
+                    </a:lnB>
+                    <a:noFill/>
+                  </a:tcPr>
+                </a:tc>
+                <a:tc>
+                  <a:txBody>
+                    <a:bodyPr/>
+                    <a:lstStyle/>
+                    <a:p>
+                      <a:pPr marL="0" marR="0" lvl="0" indent="0" algn="l" defTabSz="914400" rtl="0" eaLnBrk="1" fontAlgn="auto" latinLnBrk="1" hangingPunct="1">
+                        <a:lnSpc>
+                          <a:spcPct val="100000"/>
+                        </a:lnSpc>
+                        <a:spcBef>
+                          <a:spcPts val="0"/>
+                        </a:spcBef>
+                        <a:spcAft>
+                          <a:spcPts val="0"/>
+                        </a:spcAft>
+                        <a:buClrTx/>
+                        <a:buSzTx/>
+                        <a:buFontTx/>
+                        <a:buNone/>
+                        <a:tabLst/>
+                        <a:defRPr/>
+                      </a:pPr>
+                      <a:r>
+                        <a:rPr lang="ko-KR" altLang="en-US" sz="1800" b="0" kern="1200">
+                          <a:solidFill>
+                            <a:schemeClr val="dk1"/>
+                          </a:solidFill>
+                          <a:effectLst/>
+                          <a:latin typeface="+mn-lt"/>
+                          <a:ea typeface="+mn-ea"/>
+                          <a:cs typeface="+mn-cs"/>
+                        </a:rPr>
+                        <a:t>송신자가 </a:t>
+                      </a:r>
+                      <a:r>
+                        <a:rPr lang="ko-KR" altLang="en-US" sz="1800" b="0" u="sng" kern="1200">
+                          <a:solidFill>
+                            <a:schemeClr val="dk1"/>
+                          </a:solidFill>
+                          <a:effectLst/>
+                          <a:latin typeface="+mn-lt"/>
+                          <a:ea typeface="+mn-ea"/>
+                          <a:cs typeface="+mn-cs"/>
+                        </a:rPr>
+                        <a:t>손상되거나 손실된 </a:t>
+                      </a:r>
+                      <a:br>
+                        <a:rPr lang="en-US" altLang="ko-KR" sz="1800" b="0" u="sng" kern="1200">
+                          <a:solidFill>
+                            <a:schemeClr val="dk1"/>
+                          </a:solidFill>
+                          <a:effectLst/>
+                          <a:latin typeface="+mn-lt"/>
+                          <a:ea typeface="+mn-ea"/>
+                          <a:cs typeface="+mn-cs"/>
+                        </a:rPr>
+                      </a:br>
+                      <a:r>
+                        <a:rPr lang="ko-KR" altLang="en-US" sz="1800" b="0" u="sng" kern="1200">
+                          <a:solidFill>
+                            <a:schemeClr val="dk1"/>
+                          </a:solidFill>
+                          <a:effectLst/>
+                          <a:latin typeface="+mn-lt"/>
+                          <a:ea typeface="+mn-ea"/>
+                          <a:cs typeface="+mn-cs"/>
+                        </a:rPr>
+                        <a:t>패킷만 다시 재전송</a:t>
+                      </a:r>
+                      <a:r>
+                        <a:rPr lang="ko-KR" altLang="en-US" sz="1800" b="0" kern="1200">
+                          <a:solidFill>
+                            <a:schemeClr val="dk1"/>
+                          </a:solidFill>
+                          <a:effectLst/>
+                          <a:latin typeface="+mn-lt"/>
+                          <a:ea typeface="+mn-ea"/>
+                          <a:cs typeface="+mn-cs"/>
+                        </a:rPr>
+                        <a:t>하는 기법이다</a:t>
+                      </a:r>
+                      <a:r>
+                        <a:rPr lang="en-US" altLang="ko-KR" sz="1800" b="0" kern="1200">
+                          <a:solidFill>
+                            <a:schemeClr val="dk1"/>
+                          </a:solidFill>
+                          <a:effectLst/>
+                          <a:latin typeface="+mn-lt"/>
+                          <a:ea typeface="+mn-ea"/>
+                          <a:cs typeface="+mn-cs"/>
+                        </a:rPr>
+                        <a:t>.</a:t>
+                      </a:r>
+                    </a:p>
+                  </a:txBody>
+                  <a:tcPr>
+                    <a:lnL w="12700" cap="flat" cmpd="sng" algn="ctr">
+                      <a:solidFill>
+                        <a:schemeClr val="tx1"/>
+                      </a:solidFill>
+                      <a:prstDash val="solid"/>
+                      <a:round/>
+                      <a:headEnd type="none" w="med" len="med"/>
+                      <a:tailEnd type="none" w="med" len="med"/>
+                    </a:lnL>
+                    <a:lnR w="12700" cap="flat" cmpd="sng" algn="ctr">
+                      <a:solidFill>
+                        <a:schemeClr val="tx1"/>
+                      </a:solidFill>
+                      <a:prstDash val="solid"/>
+                      <a:round/>
+                      <a:headEnd type="none" w="med" len="med"/>
+                      <a:tailEnd type="none" w="med" len="med"/>
+                    </a:lnR>
+                    <a:lnT w="12700" cap="flat" cmpd="sng" algn="ctr">
+                      <a:solidFill>
+                        <a:schemeClr val="tx1"/>
+                      </a:solidFill>
+                      <a:prstDash val="solid"/>
+                      <a:round/>
+                      <a:headEnd type="none" w="med" len="med"/>
+                      <a:tailEnd type="none" w="med" len="med"/>
+                    </a:lnT>
+                    <a:lnB w="12700" cap="flat" cmpd="sng" algn="ctr">
+                      <a:solidFill>
+                        <a:schemeClr val="tx1"/>
+                      </a:solidFill>
+                      <a:prstDash val="solid"/>
+                      <a:round/>
+                      <a:headEnd type="none" w="med" len="med"/>
+                      <a:tailEnd type="none" w="med" len="med"/>
+                    </a:lnB>
+                    <a:noFill/>
+                  </a:tcPr>
+                </a:tc>
+                <a:extLst>
+                  <a:ext uri="{0D108BD9-81ED-4DB2-BD59-A6C34878D82A}">
+                    <a16:rowId xmlns:a16="http://schemas.microsoft.com/office/drawing/2014/main" val="2279886379"/>
+                  </a:ext>
+                </a:extLst>
+              </a:tr>
+              <a:tr h="370840">
+                <a:tc>
+                  <a:txBody>
+                    <a:bodyPr/>
+                    <a:lstStyle/>
+                    <a:p>
+                      <a:pPr latinLnBrk="1"/>
+                      <a:r>
+                        <a:rPr lang="ko-KR" altLang="en-US">
+                          <a:solidFill>
+                            <a:schemeClr val="tx1"/>
+                          </a:solidFill>
+                        </a:rPr>
+                        <a:t>장점</a:t>
+                      </a:r>
+                    </a:p>
+                  </a:txBody>
+                  <a:tcPr anchor="ctr">
+                    <a:lnL w="12700" cap="flat" cmpd="sng" algn="ctr">
+                      <a:solidFill>
+                        <a:schemeClr val="tx1"/>
+                      </a:solidFill>
+                      <a:prstDash val="solid"/>
+                      <a:round/>
+                      <a:headEnd type="none" w="med" len="med"/>
+                      <a:tailEnd type="none" w="med" len="med"/>
+                    </a:lnL>
+                    <a:lnR w="12700" cap="flat" cmpd="sng" algn="ctr">
+                      <a:solidFill>
+                        <a:schemeClr val="tx1"/>
+                      </a:solidFill>
+                      <a:prstDash val="solid"/>
+                      <a:round/>
+                      <a:headEnd type="none" w="med" len="med"/>
+                      <a:tailEnd type="none" w="med" len="med"/>
+                    </a:lnR>
+                    <a:lnT w="12700" cap="flat" cmpd="sng" algn="ctr">
+                      <a:solidFill>
+                        <a:schemeClr val="tx1"/>
+                      </a:solidFill>
+                      <a:prstDash val="solid"/>
+                      <a:round/>
+                      <a:headEnd type="none" w="med" len="med"/>
+                      <a:tailEnd type="none" w="med" len="med"/>
+                    </a:lnT>
+                    <a:lnB w="12700" cap="flat" cmpd="sng" algn="ctr">
+                      <a:solidFill>
+                        <a:schemeClr val="tx1"/>
+                      </a:solidFill>
+                      <a:prstDash val="solid"/>
+                      <a:round/>
+                      <a:headEnd type="none" w="med" len="med"/>
+                      <a:tailEnd type="none" w="med" len="med"/>
+                    </a:lnB>
+                    <a:noFill/>
+                  </a:tcPr>
+                </a:tc>
+                <a:tc>
+                  <a:txBody>
+                    <a:bodyPr/>
+                    <a:lstStyle/>
+                    <a:p>
+                      <a:r>
+                        <a:rPr lang="ko-KR" altLang="en-US" sz="1800" b="0" kern="1200">
+                          <a:solidFill>
+                            <a:schemeClr val="dk1"/>
+                          </a:solidFill>
+                          <a:effectLst/>
+                          <a:latin typeface="+mn-lt"/>
+                          <a:ea typeface="+mn-ea"/>
+                          <a:cs typeface="+mn-cs"/>
+                        </a:rPr>
+                        <a:t>수신자 버퍼링이 간단하다</a:t>
+                      </a:r>
+                      <a:r>
+                        <a:rPr lang="en-US" altLang="ko-KR" sz="1800" b="0" kern="1200">
+                          <a:solidFill>
+                            <a:schemeClr val="dk1"/>
+                          </a:solidFill>
+                          <a:effectLst/>
+                          <a:latin typeface="+mn-lt"/>
+                          <a:ea typeface="+mn-ea"/>
+                          <a:cs typeface="+mn-cs"/>
+                        </a:rPr>
+                        <a:t>.</a:t>
+                      </a:r>
+                    </a:p>
+                    <a:p>
+                      <a:endParaRPr lang="en-US" altLang="ko-KR" sz="1800" b="0" kern="1200">
+                        <a:solidFill>
+                          <a:schemeClr val="dk1"/>
+                        </a:solidFill>
+                        <a:effectLst/>
+                        <a:latin typeface="+mn-lt"/>
+                        <a:ea typeface="+mn-ea"/>
+                        <a:cs typeface="+mn-cs"/>
+                      </a:endParaRPr>
+                    </a:p>
+                    <a:p>
+                      <a:r>
+                        <a:rPr lang="ko-KR" altLang="en-US" sz="1800" b="0" kern="1200">
+                          <a:solidFill>
+                            <a:schemeClr val="dk1"/>
+                          </a:solidFill>
+                          <a:effectLst/>
+                          <a:latin typeface="+mn-lt"/>
+                          <a:ea typeface="+mn-ea"/>
+                          <a:cs typeface="+mn-cs"/>
+                        </a:rPr>
+                        <a:t>수신자가 상위 계층으로 데이터를 </a:t>
+                      </a:r>
+                      <a:br>
+                        <a:rPr lang="en-US" altLang="ko-KR" sz="1800" b="0" kern="1200">
+                          <a:solidFill>
+                            <a:schemeClr val="dk1"/>
+                          </a:solidFill>
+                          <a:effectLst/>
+                          <a:latin typeface="+mn-lt"/>
+                          <a:ea typeface="+mn-ea"/>
+                          <a:cs typeface="+mn-cs"/>
+                        </a:rPr>
+                      </a:br>
+                      <a:r>
+                        <a:rPr lang="ko-KR" altLang="en-US" sz="1800" b="0" kern="1200">
+                          <a:solidFill>
+                            <a:schemeClr val="dk1"/>
+                          </a:solidFill>
+                          <a:effectLst/>
+                          <a:latin typeface="+mn-lt"/>
+                          <a:ea typeface="+mn-ea"/>
+                          <a:cs typeface="+mn-cs"/>
+                        </a:rPr>
+                        <a:t>전달하기 위해</a:t>
+                      </a:r>
+                    </a:p>
+                    <a:p>
+                      <a:r>
+                        <a:rPr lang="ko-KR" altLang="en-US" sz="1800" b="0" kern="1200">
+                          <a:solidFill>
+                            <a:schemeClr val="dk1"/>
+                          </a:solidFill>
+                          <a:effectLst/>
+                          <a:latin typeface="+mn-lt"/>
+                          <a:ea typeface="+mn-ea"/>
+                          <a:cs typeface="+mn-cs"/>
+                        </a:rPr>
+                        <a:t>하나의 로직이 복수로 나눠진 패킷을 취합하기 쉽다</a:t>
+                      </a:r>
+                      <a:r>
+                        <a:rPr lang="en-US" altLang="ko-KR" sz="1800" b="0" kern="1200">
+                          <a:solidFill>
+                            <a:schemeClr val="dk1"/>
+                          </a:solidFill>
+                          <a:effectLst/>
+                          <a:latin typeface="+mn-lt"/>
+                          <a:ea typeface="+mn-ea"/>
+                          <a:cs typeface="+mn-cs"/>
+                        </a:rPr>
+                        <a:t>. </a:t>
+                      </a:r>
+                    </a:p>
+                  </a:txBody>
+                  <a:tcPr>
+                    <a:lnL w="12700" cap="flat" cmpd="sng" algn="ctr">
+                      <a:solidFill>
+                        <a:schemeClr val="tx1"/>
+                      </a:solidFill>
+                      <a:prstDash val="solid"/>
+                      <a:round/>
+                      <a:headEnd type="none" w="med" len="med"/>
+                      <a:tailEnd type="none" w="med" len="med"/>
+                    </a:lnL>
+                    <a:lnR w="12700" cap="flat" cmpd="sng" algn="ctr">
+                      <a:solidFill>
+                        <a:schemeClr val="tx1"/>
+                      </a:solidFill>
+                      <a:prstDash val="solid"/>
+                      <a:round/>
+                      <a:headEnd type="none" w="med" len="med"/>
+                      <a:tailEnd type="none" w="med" len="med"/>
+                    </a:lnR>
+                    <a:lnT w="12700" cap="flat" cmpd="sng" algn="ctr">
+                      <a:solidFill>
+                        <a:schemeClr val="tx1"/>
+                      </a:solidFill>
+                      <a:prstDash val="solid"/>
+                      <a:round/>
+                      <a:headEnd type="none" w="med" len="med"/>
+                      <a:tailEnd type="none" w="med" len="med"/>
+                    </a:lnT>
+                    <a:lnB w="12700" cap="flat" cmpd="sng" algn="ctr">
+                      <a:solidFill>
+                        <a:schemeClr val="tx1"/>
+                      </a:solidFill>
+                      <a:prstDash val="solid"/>
+                      <a:round/>
+                      <a:headEnd type="none" w="med" len="med"/>
+                      <a:tailEnd type="none" w="med" len="med"/>
+                    </a:lnB>
+                    <a:noFill/>
+                  </a:tcPr>
+                </a:tc>
+                <a:tc>
+                  <a:txBody>
+                    <a:bodyPr/>
+                    <a:lstStyle/>
+                    <a:p>
+                      <a:pPr marL="0" marR="0" lvl="0" indent="0" algn="l" defTabSz="914400" rtl="0" eaLnBrk="1" fontAlgn="auto" latinLnBrk="1" hangingPunct="1">
+                        <a:lnSpc>
+                          <a:spcPct val="100000"/>
+                        </a:lnSpc>
+                        <a:spcBef>
+                          <a:spcPts val="0"/>
+                        </a:spcBef>
+                        <a:spcAft>
+                          <a:spcPts val="0"/>
+                        </a:spcAft>
+                        <a:buClrTx/>
+                        <a:buSzTx/>
+                        <a:buFontTx/>
+                        <a:buNone/>
+                        <a:tabLst/>
+                        <a:defRPr/>
+                      </a:pPr>
+                      <a:r>
+                        <a:rPr lang="ko-KR" altLang="en-US" sz="1800" b="0" kern="1200">
+                          <a:solidFill>
+                            <a:schemeClr val="dk1"/>
+                          </a:solidFill>
+                          <a:effectLst/>
+                          <a:latin typeface="+mn-lt"/>
+                          <a:ea typeface="+mn-ea"/>
+                          <a:cs typeface="+mn-cs"/>
+                        </a:rPr>
+                        <a:t>채널 이용률을 줄인다</a:t>
+                      </a:r>
+                      <a:r>
+                        <a:rPr lang="en-US" altLang="ko-KR" sz="1800" b="0" kern="1200">
+                          <a:solidFill>
+                            <a:schemeClr val="dk1"/>
+                          </a:solidFill>
+                          <a:effectLst/>
+                          <a:latin typeface="+mn-lt"/>
+                          <a:ea typeface="+mn-ea"/>
+                          <a:cs typeface="+mn-cs"/>
+                        </a:rPr>
+                        <a:t>.</a:t>
+                      </a:r>
+                    </a:p>
+                  </a:txBody>
+                  <a:tcPr>
+                    <a:lnL w="12700" cap="flat" cmpd="sng" algn="ctr">
+                      <a:solidFill>
+                        <a:schemeClr val="tx1"/>
+                      </a:solidFill>
+                      <a:prstDash val="solid"/>
+                      <a:round/>
+                      <a:headEnd type="none" w="med" len="med"/>
+                      <a:tailEnd type="none" w="med" len="med"/>
+                    </a:lnL>
+                    <a:lnR w="12700" cap="flat" cmpd="sng" algn="ctr">
+                      <a:solidFill>
+                        <a:schemeClr val="tx1"/>
+                      </a:solidFill>
+                      <a:prstDash val="solid"/>
+                      <a:round/>
+                      <a:headEnd type="none" w="med" len="med"/>
+                      <a:tailEnd type="none" w="med" len="med"/>
+                    </a:lnR>
+                    <a:lnT w="12700" cap="flat" cmpd="sng" algn="ctr">
+                      <a:solidFill>
+                        <a:schemeClr val="tx1"/>
+                      </a:solidFill>
+                      <a:prstDash val="solid"/>
+                      <a:round/>
+                      <a:headEnd type="none" w="med" len="med"/>
+                      <a:tailEnd type="none" w="med" len="med"/>
+                    </a:lnT>
+                    <a:lnB w="12700" cap="flat" cmpd="sng" algn="ctr">
+                      <a:solidFill>
+                        <a:schemeClr val="tx1"/>
+                      </a:solidFill>
+                      <a:prstDash val="solid"/>
+                      <a:round/>
+                      <a:headEnd type="none" w="med" len="med"/>
+                      <a:tailEnd type="none" w="med" len="med"/>
+                    </a:lnB>
+                    <a:noFill/>
+                  </a:tcPr>
+                </a:tc>
+                <a:extLst>
+                  <a:ext uri="{0D108BD9-81ED-4DB2-BD59-A6C34878D82A}">
+                    <a16:rowId xmlns:a16="http://schemas.microsoft.com/office/drawing/2014/main" val="3509644011"/>
+                  </a:ext>
+                </a:extLst>
+              </a:tr>
+              <a:tr h="370840">
+                <a:tc>
+                  <a:txBody>
+                    <a:bodyPr/>
+                    <a:lstStyle/>
+                    <a:p>
+                      <a:pPr latinLnBrk="1"/>
+                      <a:r>
+                        <a:rPr lang="ko-KR" altLang="en-US">
+                          <a:solidFill>
+                            <a:schemeClr val="tx1"/>
+                          </a:solidFill>
+                        </a:rPr>
+                        <a:t>단점</a:t>
+                      </a:r>
+                    </a:p>
+                  </a:txBody>
+                  <a:tcPr anchor="ctr">
+                    <a:lnL w="12700" cap="flat" cmpd="sng" algn="ctr">
+                      <a:solidFill>
+                        <a:schemeClr val="tx1"/>
+                      </a:solidFill>
+                      <a:prstDash val="solid"/>
+                      <a:round/>
+                      <a:headEnd type="none" w="med" len="med"/>
+                      <a:tailEnd type="none" w="med" len="med"/>
+                    </a:lnL>
+                    <a:lnR w="12700" cap="flat" cmpd="sng" algn="ctr">
+                      <a:solidFill>
+                        <a:schemeClr val="tx1"/>
+                      </a:solidFill>
+                      <a:prstDash val="solid"/>
+                      <a:round/>
+                      <a:headEnd type="none" w="med" len="med"/>
+                      <a:tailEnd type="none" w="med" len="med"/>
+                    </a:lnR>
+                    <a:lnT w="12700" cap="flat" cmpd="sng" algn="ctr">
+                      <a:solidFill>
+                        <a:schemeClr val="tx1"/>
+                      </a:solidFill>
+                      <a:prstDash val="solid"/>
+                      <a:round/>
+                      <a:headEnd type="none" w="med" len="med"/>
+                      <a:tailEnd type="none" w="med" len="med"/>
+                    </a:lnT>
+                    <a:lnB w="12700" cap="flat" cmpd="sng" algn="ctr">
+                      <a:solidFill>
+                        <a:schemeClr val="tx1"/>
+                      </a:solidFill>
+                      <a:prstDash val="solid"/>
+                      <a:round/>
+                      <a:headEnd type="none" w="med" len="med"/>
+                      <a:tailEnd type="none" w="med" len="med"/>
+                    </a:lnB>
+                    <a:noFill/>
+                  </a:tcPr>
+                </a:tc>
+                <a:tc>
+                  <a:txBody>
+                    <a:bodyPr/>
+                    <a:lstStyle/>
+                    <a:p>
+                      <a:pPr marL="0" marR="0" lvl="0" indent="0" algn="l" defTabSz="914400" rtl="0" eaLnBrk="1" fontAlgn="auto" latinLnBrk="1" hangingPunct="1">
+                        <a:lnSpc>
+                          <a:spcPct val="100000"/>
+                        </a:lnSpc>
+                        <a:spcBef>
+                          <a:spcPts val="0"/>
+                        </a:spcBef>
+                        <a:spcAft>
+                          <a:spcPts val="0"/>
+                        </a:spcAft>
+                        <a:buClrTx/>
+                        <a:buSzTx/>
+                        <a:buFontTx/>
+                        <a:buNone/>
+                        <a:tabLst/>
+                        <a:defRPr/>
+                      </a:pPr>
+                      <a:r>
+                        <a:rPr lang="ko-KR" altLang="en-US" sz="1800" b="0" kern="1200">
+                          <a:solidFill>
+                            <a:schemeClr val="dk1"/>
+                          </a:solidFill>
+                          <a:effectLst/>
+                          <a:latin typeface="+mn-lt"/>
+                          <a:ea typeface="+mn-ea"/>
+                          <a:cs typeface="+mn-cs"/>
+                        </a:rPr>
+                        <a:t>재전송이 높아져 채널 이용률이 높아진다</a:t>
+                      </a:r>
+                    </a:p>
+                  </a:txBody>
+                  <a:tcPr>
+                    <a:lnL w="12700" cap="flat" cmpd="sng" algn="ctr">
+                      <a:solidFill>
+                        <a:schemeClr val="tx1"/>
+                      </a:solidFill>
+                      <a:prstDash val="solid"/>
+                      <a:round/>
+                      <a:headEnd type="none" w="med" len="med"/>
+                      <a:tailEnd type="none" w="med" len="med"/>
+                    </a:lnL>
+                    <a:lnR w="12700" cap="flat" cmpd="sng" algn="ctr">
+                      <a:solidFill>
+                        <a:schemeClr val="tx1"/>
+                      </a:solidFill>
+                      <a:prstDash val="solid"/>
+                      <a:round/>
+                      <a:headEnd type="none" w="med" len="med"/>
+                      <a:tailEnd type="none" w="med" len="med"/>
+                    </a:lnR>
+                    <a:lnT w="12700" cap="flat" cmpd="sng" algn="ctr">
+                      <a:solidFill>
+                        <a:schemeClr val="tx1"/>
+                      </a:solidFill>
+                      <a:prstDash val="solid"/>
+                      <a:round/>
+                      <a:headEnd type="none" w="med" len="med"/>
+                      <a:tailEnd type="none" w="med" len="med"/>
+                    </a:lnT>
+                    <a:lnB w="12700" cap="flat" cmpd="sng" algn="ctr">
+                      <a:solidFill>
+                        <a:schemeClr val="tx1"/>
+                      </a:solidFill>
+                      <a:prstDash val="solid"/>
+                      <a:round/>
+                      <a:headEnd type="none" w="med" len="med"/>
+                      <a:tailEnd type="none" w="med" len="med"/>
+                    </a:lnB>
+                    <a:noFill/>
+                  </a:tcPr>
+                </a:tc>
+                <a:tc>
+                  <a:txBody>
+                    <a:bodyPr/>
+                    <a:lstStyle/>
+                    <a:p>
+                      <a:pPr marL="0" marR="0" lvl="0" indent="0" algn="l" defTabSz="914400" rtl="0" eaLnBrk="1" fontAlgn="auto" latinLnBrk="1" hangingPunct="1">
+                        <a:lnSpc>
+                          <a:spcPct val="100000"/>
+                        </a:lnSpc>
+                        <a:spcBef>
+                          <a:spcPts val="0"/>
+                        </a:spcBef>
+                        <a:spcAft>
+                          <a:spcPts val="0"/>
+                        </a:spcAft>
+                        <a:buClrTx/>
+                        <a:buSzTx/>
+                        <a:buFontTx/>
+                        <a:buNone/>
+                        <a:tabLst/>
+                        <a:defRPr/>
+                      </a:pPr>
+                      <a:r>
+                        <a:rPr lang="en-US" altLang="ko-KR" sz="1800" b="0" kern="1200">
+                          <a:solidFill>
+                            <a:schemeClr val="dk1"/>
+                          </a:solidFill>
+                          <a:effectLst/>
+                          <a:latin typeface="+mn-lt"/>
+                          <a:ea typeface="+mn-ea"/>
+                          <a:cs typeface="+mn-cs"/>
+                        </a:rPr>
+                        <a:t>a. </a:t>
+                      </a:r>
+                      <a:r>
+                        <a:rPr lang="ko-KR" altLang="en-US" sz="1800" b="0" kern="1200">
+                          <a:solidFill>
+                            <a:schemeClr val="dk1"/>
+                          </a:solidFill>
+                          <a:effectLst/>
+                          <a:latin typeface="+mn-lt"/>
+                          <a:ea typeface="+mn-ea"/>
+                          <a:cs typeface="+mn-cs"/>
+                        </a:rPr>
+                        <a:t>수신자에서 패킷을 취합하기 어렵다</a:t>
+                      </a:r>
+                      <a:r>
+                        <a:rPr lang="en-US" altLang="ko-KR" sz="1800" b="0" kern="1200">
+                          <a:solidFill>
+                            <a:schemeClr val="dk1"/>
+                          </a:solidFill>
+                          <a:effectLst/>
+                          <a:latin typeface="+mn-lt"/>
+                          <a:ea typeface="+mn-ea"/>
+                          <a:cs typeface="+mn-cs"/>
+                        </a:rPr>
+                        <a:t>.</a:t>
+                      </a:r>
+                      <a:br>
+                        <a:rPr lang="en-US" altLang="ko-KR" sz="1800" b="0" kern="1200">
+                          <a:solidFill>
+                            <a:schemeClr val="dk1"/>
+                          </a:solidFill>
+                          <a:effectLst/>
+                          <a:latin typeface="+mn-lt"/>
+                          <a:ea typeface="+mn-ea"/>
+                          <a:cs typeface="+mn-cs"/>
+                        </a:rPr>
+                      </a:br>
+                      <a:br>
+                        <a:rPr lang="en-US" altLang="ko-KR" sz="1800" b="0" kern="1200">
+                          <a:solidFill>
+                            <a:schemeClr val="dk1"/>
+                          </a:solidFill>
+                          <a:effectLst/>
+                          <a:latin typeface="+mn-lt"/>
+                          <a:ea typeface="+mn-ea"/>
+                          <a:cs typeface="+mn-cs"/>
+                        </a:rPr>
+                      </a:br>
+                      <a:r>
+                        <a:rPr lang="en-US" altLang="ko-KR" sz="1800" b="0" kern="1200">
+                          <a:solidFill>
+                            <a:schemeClr val="dk1"/>
+                          </a:solidFill>
+                          <a:effectLst/>
+                          <a:latin typeface="+mn-lt"/>
+                          <a:ea typeface="+mn-ea"/>
+                          <a:cs typeface="+mn-cs"/>
+                        </a:rPr>
+                        <a:t>b. </a:t>
+                      </a:r>
+                      <a:r>
+                        <a:rPr lang="ko-KR" altLang="en-US" sz="1800" b="0" kern="1200">
+                          <a:solidFill>
+                            <a:schemeClr val="dk1"/>
+                          </a:solidFill>
+                          <a:effectLst/>
+                          <a:latin typeface="+mn-lt"/>
+                          <a:ea typeface="+mn-ea"/>
+                          <a:cs typeface="+mn-cs"/>
+                        </a:rPr>
+                        <a:t>패킷마다 타이머를 사용한다</a:t>
+                      </a:r>
+                      <a:r>
+                        <a:rPr lang="en-US" altLang="ko-KR" sz="1800" b="0" kern="1200">
+                          <a:solidFill>
+                            <a:schemeClr val="dk1"/>
+                          </a:solidFill>
+                          <a:effectLst/>
+                          <a:latin typeface="+mn-lt"/>
+                          <a:ea typeface="+mn-ea"/>
+                          <a:cs typeface="+mn-cs"/>
+                        </a:rPr>
+                        <a:t>.</a:t>
+                      </a:r>
+                    </a:p>
+                  </a:txBody>
+                  <a:tcPr>
+                    <a:lnL w="12700" cap="flat" cmpd="sng" algn="ctr">
+                      <a:solidFill>
+                        <a:schemeClr val="tx1"/>
+                      </a:solidFill>
+                      <a:prstDash val="solid"/>
+                      <a:round/>
+                      <a:headEnd type="none" w="med" len="med"/>
+                      <a:tailEnd type="none" w="med" len="med"/>
+                    </a:lnL>
+                    <a:lnR w="12700" cap="flat" cmpd="sng" algn="ctr">
+                      <a:solidFill>
+                        <a:schemeClr val="tx1"/>
+                      </a:solidFill>
+                      <a:prstDash val="solid"/>
+                      <a:round/>
+                      <a:headEnd type="none" w="med" len="med"/>
+                      <a:tailEnd type="none" w="med" len="med"/>
+                    </a:lnR>
+                    <a:lnT w="12700" cap="flat" cmpd="sng" algn="ctr">
+                      <a:solidFill>
+                        <a:schemeClr val="tx1"/>
+                      </a:solidFill>
+                      <a:prstDash val="solid"/>
+                      <a:round/>
+                      <a:headEnd type="none" w="med" len="med"/>
+                      <a:tailEnd type="none" w="med" len="med"/>
+                    </a:lnT>
+                    <a:lnB w="12700" cap="flat" cmpd="sng" algn="ctr">
+                      <a:solidFill>
+                        <a:schemeClr val="tx1"/>
+                      </a:solidFill>
+                      <a:prstDash val="solid"/>
+                      <a:round/>
+                      <a:headEnd type="none" w="med" len="med"/>
+                      <a:tailEnd type="none" w="med" len="med"/>
+                    </a:lnB>
+                    <a:noFill/>
+                  </a:tcPr>
+                </a:tc>
+                <a:extLst>
+                  <a:ext uri="{0D108BD9-81ED-4DB2-BD59-A6C34878D82A}">
+                    <a16:rowId xmlns:a16="http://schemas.microsoft.com/office/drawing/2014/main" val="632219432"/>
+                  </a:ext>
+                </a:extLst>
+              </a:tr>
+            </a:tbl>
+          </a:graphicData>
+        </a:graphic>
+      </p:graphicFrame>
+    </p:spTree>
+    <p:extLst>
+      <p:ext uri="{BB962C8B-B14F-4D97-AF65-F5344CB8AC3E}">
+        <p14:creationId xmlns:p14="http://schemas.microsoft.com/office/powerpoint/2010/main" val="2971191391"/>
+      </p:ext>
+    </p:extLst>
+  </p:cSld>
+  <p:clrMapOvr>
+    <a:masterClrMapping/>
+  </p:clrMapOvr>
+</p:sld>
+</file>
+
+<file path=ppt/slides/slide11.xml><?xml version="1.0" encoding="utf-8"?>
 <p:sld xmlns:a="http://schemas.openxmlformats.org/drawingml/2006/main" xmlns:r="http://schemas.openxmlformats.org/officeDocument/2006/relationships" xmlns:p="http://schemas.openxmlformats.org/presentationml/2006/main">
   <p:cSld>
     <p:spTree>
@@ -6254,7 +7512,7 @@
 </p:sld>
 </file>
 
-<file path=ppt/slides/slide11.xml><?xml version="1.0" encoding="utf-8"?>
+<file path=ppt/slides/slide12.xml><?xml version="1.0" encoding="utf-8"?>
 <p:sld xmlns:a="http://schemas.openxmlformats.org/drawingml/2006/main" xmlns:r="http://schemas.openxmlformats.org/officeDocument/2006/relationships" xmlns:p="http://schemas.openxmlformats.org/presentationml/2006/main">
   <p:cSld>
     <p:spTree>
@@ -7285,7 +8543,7 @@
 </p:sld>
 </file>
 
-<file path=ppt/slides/slide12.xml><?xml version="1.0" encoding="utf-8"?>
+<file path=ppt/slides/slide13.xml><?xml version="1.0" encoding="utf-8"?>
 <p:sld xmlns:a="http://schemas.openxmlformats.org/drawingml/2006/main" xmlns:r="http://schemas.openxmlformats.org/officeDocument/2006/relationships" xmlns:p="http://schemas.openxmlformats.org/presentationml/2006/main">
   <p:cSld>
     <p:spTree>
@@ -7545,7 +8803,7 @@
 </p:sld>
 </file>
 
-<file path=ppt/slides/slide13.xml><?xml version="1.0" encoding="utf-8"?>
+<file path=ppt/slides/slide14.xml><?xml version="1.0" encoding="utf-8"?>
 <p:sld xmlns:a="http://schemas.openxmlformats.org/drawingml/2006/main" xmlns:r="http://schemas.openxmlformats.org/officeDocument/2006/relationships" xmlns:p="http://schemas.openxmlformats.org/presentationml/2006/main">
   <p:cSld>
     <p:spTree>
@@ -9297,7 +10555,7 @@
 </p:sld>
 </file>
 
-<file path=ppt/slides/slide14.xml><?xml version="1.0" encoding="utf-8"?>
+<file path=ppt/slides/slide15.xml><?xml version="1.0" encoding="utf-8"?>
 <p:sld xmlns:a="http://schemas.openxmlformats.org/drawingml/2006/main" xmlns:r="http://schemas.openxmlformats.org/officeDocument/2006/relationships" xmlns:p="http://schemas.openxmlformats.org/presentationml/2006/main">
   <p:cSld>
     <p:spTree>
@@ -10447,7 +11705,7 @@
 </p:sld>
 </file>
 
-<file path=ppt/slides/slide15.xml><?xml version="1.0" encoding="utf-8"?>
+<file path=ppt/slides/slide16.xml><?xml version="1.0" encoding="utf-8"?>
 <p:sld xmlns:a="http://schemas.openxmlformats.org/drawingml/2006/main" xmlns:r="http://schemas.openxmlformats.org/officeDocument/2006/relationships" xmlns:p="http://schemas.openxmlformats.org/presentationml/2006/main">
   <p:cSld>
     <p:spTree>
@@ -11171,7 +12429,7 @@
 </p:sld>
 </file>
 
-<file path=ppt/slides/slide16.xml><?xml version="1.0" encoding="utf-8"?>
+<file path=ppt/slides/slide17.xml><?xml version="1.0" encoding="utf-8"?>
 <p:sld xmlns:a="http://schemas.openxmlformats.org/drawingml/2006/main" xmlns:r="http://schemas.openxmlformats.org/officeDocument/2006/relationships" xmlns:p="http://schemas.openxmlformats.org/presentationml/2006/main">
   <p:cSld>
     <p:spTree>
@@ -11646,7 +12904,7 @@
 </p:sld>
 </file>
 
-<file path=ppt/slides/slide17.xml><?xml version="1.0" encoding="utf-8"?>
+<file path=ppt/slides/slide18.xml><?xml version="1.0" encoding="utf-8"?>
 <p:sld xmlns:a="http://schemas.openxmlformats.org/drawingml/2006/main" xmlns:r="http://schemas.openxmlformats.org/officeDocument/2006/relationships" xmlns:p="http://schemas.openxmlformats.org/presentationml/2006/main">
   <p:cSld>
     <p:spTree>
@@ -12316,7 +13574,7 @@
 </p:sld>
 </file>
 
-<file path=ppt/slides/slide18.xml><?xml version="1.0" encoding="utf-8"?>
+<file path=ppt/slides/slide19.xml><?xml version="1.0" encoding="utf-8"?>
 <p:sld xmlns:a="http://schemas.openxmlformats.org/drawingml/2006/main" xmlns:r="http://schemas.openxmlformats.org/officeDocument/2006/relationships" xmlns:p="http://schemas.openxmlformats.org/presentationml/2006/main">
   <p:cSld>
     <p:spTree>
@@ -12943,133 +14201,6 @@
           <p:spPr>
             <a:xfrm>
               <a:off x="2422182" y="3724772"/>
-              <a:ext cx="7918450" cy="307777"/>
-            </a:xfrm>
-            <a:prstGeom prst="rect">
-              <a:avLst/>
-            </a:prstGeom>
-            <a:noFill/>
-            <a:scene3d>
-              <a:camera prst="obliqueTopLeft"/>
-              <a:lightRig rig="threePt" dir="t"/>
-            </a:scene3d>
-          </p:spPr>
-          <p:txBody>
-            <a:bodyPr>
-              <a:spAutoFit/>
-            </a:bodyPr>
-            <a:lstStyle>
-              <a:defPPr>
-                <a:defRPr lang="ko-KR"/>
-              </a:defPPr>
-              <a:lvl1pPr>
-                <a:defRPr sz="2800" spc="-150">
-                  <a:latin typeface="나눔스퀘어 ExtraBold" panose="020B0600000101010101" pitchFamily="50" charset="-127"/>
-                  <a:ea typeface="나눔스퀘어 ExtraBold" panose="020B0600000101010101" pitchFamily="50" charset="-127"/>
-                </a:defRPr>
-              </a:lvl1pPr>
-            </a:lstStyle>
-            <a:p>
-              <a:pPr eaLnBrk="1" hangingPunct="1">
-                <a:defRPr/>
-              </a:pPr>
-              <a:endParaRPr lang="ko-KR" altLang="en-US" sz="1400" dirty="0">
-                <a:latin typeface="맑은 고딕" panose="020B0503020000020004" pitchFamily="50" charset="-127"/>
-                <a:ea typeface="맑은 고딕" panose="020B0503020000020004" pitchFamily="50" charset="-127"/>
-                <a:cs typeface="Arial" panose="020B0604020202020204" pitchFamily="34" charset="0"/>
-              </a:endParaRPr>
-            </a:p>
-          </p:txBody>
-        </p:sp>
-      </p:grpSp>
-      <p:grpSp>
-        <p:nvGrpSpPr>
-          <p:cNvPr id="4" name="그룹 3">
-            <a:extLst>
-              <a:ext uri="{FF2B5EF4-FFF2-40B4-BE49-F238E27FC236}">
-                <a16:creationId xmlns:a16="http://schemas.microsoft.com/office/drawing/2014/main" id="{E1F81AFC-33AE-463D-BEEC-03783BFC9279}"/>
-              </a:ext>
-            </a:extLst>
-          </p:cNvPr>
-          <p:cNvGrpSpPr/>
-          <p:nvPr/>
-        </p:nvGrpSpPr>
-        <p:grpSpPr>
-          <a:xfrm>
-            <a:off x="2422182" y="4515289"/>
-            <a:ext cx="7918450" cy="806150"/>
-            <a:chOff x="2422680" y="4204821"/>
-            <a:chExt cx="7918450" cy="806150"/>
-          </a:xfrm>
-        </p:grpSpPr>
-        <p:sp>
-          <p:nvSpPr>
-            <p:cNvPr id="53" name="TextBox 52">
-              <a:extLst>
-                <a:ext uri="{FF2B5EF4-FFF2-40B4-BE49-F238E27FC236}">
-                  <a16:creationId xmlns:a16="http://schemas.microsoft.com/office/drawing/2014/main" id="{57AD9E96-3343-4E3A-8A84-1271AB74D742}"/>
-                </a:ext>
-              </a:extLst>
-            </p:cNvPr>
-            <p:cNvSpPr txBox="1"/>
-            <p:nvPr/>
-          </p:nvSpPr>
-          <p:spPr>
-            <a:xfrm>
-              <a:off x="2422680" y="4204821"/>
-              <a:ext cx="3270250" cy="369332"/>
-            </a:xfrm>
-            <a:prstGeom prst="rect">
-              <a:avLst/>
-            </a:prstGeom>
-            <a:noFill/>
-            <a:scene3d>
-              <a:camera prst="obliqueTopLeft"/>
-              <a:lightRig rig="threePt" dir="t"/>
-            </a:scene3d>
-          </p:spPr>
-          <p:txBody>
-            <a:bodyPr>
-              <a:spAutoFit/>
-            </a:bodyPr>
-            <a:lstStyle>
-              <a:defPPr>
-                <a:defRPr lang="ko-KR"/>
-              </a:defPPr>
-              <a:lvl1pPr>
-                <a:defRPr sz="2800" spc="-150">
-                  <a:latin typeface="나눔스퀘어 ExtraBold" panose="020B0600000101010101" pitchFamily="50" charset="-127"/>
-                  <a:ea typeface="나눔스퀘어 ExtraBold" panose="020B0600000101010101" pitchFamily="50" charset="-127"/>
-                </a:defRPr>
-              </a:lvl1pPr>
-            </a:lstStyle>
-            <a:p>
-              <a:pPr eaLnBrk="1" hangingPunct="1">
-                <a:defRPr/>
-              </a:pPr>
-              <a:endParaRPr lang="ko-KR" altLang="en-US" sz="1800" dirty="0">
-                <a:latin typeface="맑은 고딕" panose="020B0503020000020004" pitchFamily="50" charset="-127"/>
-                <a:ea typeface="맑은 고딕" panose="020B0503020000020004" pitchFamily="50" charset="-127"/>
-                <a:cs typeface="Arial" panose="020B0604020202020204" pitchFamily="34" charset="0"/>
-              </a:endParaRPr>
-            </a:p>
-          </p:txBody>
-        </p:sp>
-        <p:sp>
-          <p:nvSpPr>
-            <p:cNvPr id="54" name="TextBox 53">
-              <a:extLst>
-                <a:ext uri="{FF2B5EF4-FFF2-40B4-BE49-F238E27FC236}">
-                  <a16:creationId xmlns:a16="http://schemas.microsoft.com/office/drawing/2014/main" id="{AEEF72DF-1059-44B3-900A-8DA80408FBB6}"/>
-                </a:ext>
-              </a:extLst>
-            </p:cNvPr>
-            <p:cNvSpPr txBox="1"/>
-            <p:nvPr/>
-          </p:nvSpPr>
-          <p:spPr>
-            <a:xfrm>
-              <a:off x="2422680" y="4703194"/>
               <a:ext cx="7918450" cy="307777"/>
             </a:xfrm>
             <a:prstGeom prst="rect">
@@ -13536,6 +14667,399 @@
           </p:txBody>
         </p:sp>
       </p:grpSp>
+      <p:sp>
+        <p:nvSpPr>
+          <p:cNvPr id="25" name="Rectangle 150">
+            <a:extLst>
+              <a:ext uri="{FF2B5EF4-FFF2-40B4-BE49-F238E27FC236}">
+                <a16:creationId xmlns:a16="http://schemas.microsoft.com/office/drawing/2014/main" id="{6E2D5F8A-6F41-6920-E10C-83AD8ECEB514}"/>
+              </a:ext>
+            </a:extLst>
+          </p:cNvPr>
+          <p:cNvSpPr txBox="1">
+            <a:spLocks noChangeArrowheads="1"/>
+          </p:cNvSpPr>
+          <p:nvPr/>
+        </p:nvSpPr>
+        <p:spPr bwMode="auto">
+          <a:xfrm>
+            <a:off x="488836" y="4868717"/>
+            <a:ext cx="7539548" cy="1872650"/>
+          </a:xfrm>
+          <a:prstGeom prst="rect">
+            <a:avLst/>
+          </a:prstGeom>
+          <a:noFill/>
+          <a:ln>
+            <a:noFill/>
+          </a:ln>
+          <a:effectLst/>
+          <a:extLst>
+            <a:ext uri="{909E8E84-426E-40DD-AFC4-6F175D3DCCD1}">
+              <a14:hiddenFill xmlns:a14="http://schemas.microsoft.com/office/drawing/2010/main">
+                <a:solidFill>
+                  <a:schemeClr val="accent1"/>
+                </a:solidFill>
+              </a14:hiddenFill>
+            </a:ext>
+            <a:ext uri="{91240B29-F687-4F45-9708-019B960494DF}">
+              <a14:hiddenLine xmlns:a14="http://schemas.microsoft.com/office/drawing/2010/main" w="9525">
+                <a:solidFill>
+                  <a:schemeClr val="tx1"/>
+                </a:solidFill>
+                <a:miter lim="800000"/>
+                <a:headEnd/>
+                <a:tailEnd/>
+              </a14:hiddenLine>
+            </a:ext>
+            <a:ext uri="{AF507438-7753-43E0-B8FC-AC1667EBCBE1}">
+              <a14:hiddenEffects xmlns:a14="http://schemas.microsoft.com/office/drawing/2010/main">
+                <a:effectLst>
+                  <a:outerShdw dist="35921" dir="2700000" algn="ctr" rotWithShape="0">
+                    <a:schemeClr val="bg2"/>
+                  </a:outerShdw>
+                </a:effectLst>
+              </a14:hiddenEffects>
+            </a:ext>
+          </a:extLst>
+        </p:spPr>
+        <p:txBody>
+          <a:bodyPr vert="horz" wrap="square" lIns="91440" tIns="45720" rIns="91440" bIns="45720" numCol="1" anchor="ctr" anchorCtr="0" compatLnSpc="1">
+            <a:prstTxWarp prst="textNoShape">
+              <a:avLst/>
+            </a:prstTxWarp>
+          </a:bodyPr>
+          <a:lstStyle>
+            <a:lvl1pPr algn="ctr" rtl="0" eaLnBrk="0" fontAlgn="base" hangingPunct="0">
+              <a:spcBef>
+                <a:spcPct val="0"/>
+              </a:spcBef>
+              <a:spcAft>
+                <a:spcPct val="0"/>
+              </a:spcAft>
+              <a:defRPr sz="4400" kern="1200">
+                <a:solidFill>
+                  <a:schemeClr val="tx2"/>
+                </a:solidFill>
+                <a:latin typeface="맑은 고딕" panose="020B0503020000020004" pitchFamily="50" charset="-127"/>
+                <a:ea typeface="맑은 고딕" panose="020B0503020000020004" pitchFamily="50" charset="-127"/>
+                <a:cs typeface="+mj-cs"/>
+              </a:defRPr>
+            </a:lvl1pPr>
+            <a:lvl2pPr algn="ctr" rtl="0" eaLnBrk="0" fontAlgn="base" hangingPunct="0">
+              <a:spcBef>
+                <a:spcPct val="0"/>
+              </a:spcBef>
+              <a:spcAft>
+                <a:spcPct val="0"/>
+              </a:spcAft>
+              <a:defRPr sz="4400">
+                <a:solidFill>
+                  <a:schemeClr val="tx2"/>
+                </a:solidFill>
+                <a:latin typeface="Arial" panose="020B0604020202020204" pitchFamily="34" charset="0"/>
+                <a:ea typeface="Arial Unicode MS" panose="020B0604020202020204" pitchFamily="50" charset="-127"/>
+                <a:cs typeface="Arial" panose="020B0604020202020204" pitchFamily="34" charset="0"/>
+              </a:defRPr>
+            </a:lvl2pPr>
+            <a:lvl3pPr algn="ctr" rtl="0" eaLnBrk="0" fontAlgn="base" hangingPunct="0">
+              <a:spcBef>
+                <a:spcPct val="0"/>
+              </a:spcBef>
+              <a:spcAft>
+                <a:spcPct val="0"/>
+              </a:spcAft>
+              <a:defRPr sz="4400">
+                <a:solidFill>
+                  <a:schemeClr val="tx2"/>
+                </a:solidFill>
+                <a:latin typeface="Arial" panose="020B0604020202020204" pitchFamily="34" charset="0"/>
+                <a:ea typeface="Arial Unicode MS" panose="020B0604020202020204" pitchFamily="50" charset="-127"/>
+                <a:cs typeface="Arial" panose="020B0604020202020204" pitchFamily="34" charset="0"/>
+              </a:defRPr>
+            </a:lvl3pPr>
+            <a:lvl4pPr algn="ctr" rtl="0" eaLnBrk="0" fontAlgn="base" hangingPunct="0">
+              <a:spcBef>
+                <a:spcPct val="0"/>
+              </a:spcBef>
+              <a:spcAft>
+                <a:spcPct val="0"/>
+              </a:spcAft>
+              <a:defRPr sz="4400">
+                <a:solidFill>
+                  <a:schemeClr val="tx2"/>
+                </a:solidFill>
+                <a:latin typeface="Arial" panose="020B0604020202020204" pitchFamily="34" charset="0"/>
+                <a:ea typeface="Arial Unicode MS" panose="020B0604020202020204" pitchFamily="50" charset="-127"/>
+                <a:cs typeface="Arial" panose="020B0604020202020204" pitchFamily="34" charset="0"/>
+              </a:defRPr>
+            </a:lvl4pPr>
+            <a:lvl5pPr algn="ctr" rtl="0" eaLnBrk="0" fontAlgn="base" hangingPunct="0">
+              <a:spcBef>
+                <a:spcPct val="0"/>
+              </a:spcBef>
+              <a:spcAft>
+                <a:spcPct val="0"/>
+              </a:spcAft>
+              <a:defRPr sz="4400">
+                <a:solidFill>
+                  <a:schemeClr val="tx2"/>
+                </a:solidFill>
+                <a:latin typeface="Arial" panose="020B0604020202020204" pitchFamily="34" charset="0"/>
+                <a:ea typeface="Arial Unicode MS" panose="020B0604020202020204" pitchFamily="50" charset="-127"/>
+                <a:cs typeface="Arial" panose="020B0604020202020204" pitchFamily="34" charset="0"/>
+              </a:defRPr>
+            </a:lvl5pPr>
+            <a:lvl6pPr marL="457200" algn="ctr" rtl="0" fontAlgn="base">
+              <a:spcBef>
+                <a:spcPct val="0"/>
+              </a:spcBef>
+              <a:spcAft>
+                <a:spcPct val="0"/>
+              </a:spcAft>
+              <a:defRPr sz="4400">
+                <a:solidFill>
+                  <a:schemeClr val="tx2"/>
+                </a:solidFill>
+                <a:latin typeface="Arial" panose="020B0604020202020204" pitchFamily="34" charset="0"/>
+                <a:cs typeface="Arial" panose="020B0604020202020204" pitchFamily="34" charset="0"/>
+              </a:defRPr>
+            </a:lvl6pPr>
+            <a:lvl7pPr marL="914400" algn="ctr" rtl="0" fontAlgn="base">
+              <a:spcBef>
+                <a:spcPct val="0"/>
+              </a:spcBef>
+              <a:spcAft>
+                <a:spcPct val="0"/>
+              </a:spcAft>
+              <a:defRPr sz="4400">
+                <a:solidFill>
+                  <a:schemeClr val="tx2"/>
+                </a:solidFill>
+                <a:latin typeface="Arial" panose="020B0604020202020204" pitchFamily="34" charset="0"/>
+                <a:cs typeface="Arial" panose="020B0604020202020204" pitchFamily="34" charset="0"/>
+              </a:defRPr>
+            </a:lvl7pPr>
+            <a:lvl8pPr marL="1371600" algn="ctr" rtl="0" fontAlgn="base">
+              <a:spcBef>
+                <a:spcPct val="0"/>
+              </a:spcBef>
+              <a:spcAft>
+                <a:spcPct val="0"/>
+              </a:spcAft>
+              <a:defRPr sz="4400">
+                <a:solidFill>
+                  <a:schemeClr val="tx2"/>
+                </a:solidFill>
+                <a:latin typeface="Arial" panose="020B0604020202020204" pitchFamily="34" charset="0"/>
+                <a:cs typeface="Arial" panose="020B0604020202020204" pitchFamily="34" charset="0"/>
+              </a:defRPr>
+            </a:lvl8pPr>
+            <a:lvl9pPr marL="1828800" algn="ctr" rtl="0" fontAlgn="base">
+              <a:spcBef>
+                <a:spcPct val="0"/>
+              </a:spcBef>
+              <a:spcAft>
+                <a:spcPct val="0"/>
+              </a:spcAft>
+              <a:defRPr sz="4400">
+                <a:solidFill>
+                  <a:schemeClr val="tx2"/>
+                </a:solidFill>
+                <a:latin typeface="Arial" panose="020B0604020202020204" pitchFamily="34" charset="0"/>
+                <a:cs typeface="Arial" panose="020B0604020202020204" pitchFamily="34" charset="0"/>
+              </a:defRPr>
+            </a:lvl9pPr>
+          </a:lstStyle>
+          <a:p>
+            <a:pPr algn="l" eaLnBrk="1" hangingPunct="1"/>
+            <a:r>
+              <a:rPr lang="ko-KR" altLang="en-US" sz="3200" b="1">
+                <a:solidFill>
+                  <a:schemeClr val="tx1"/>
+                </a:solidFill>
+              </a:rPr>
+              <a:t>의의</a:t>
+            </a:r>
+            <a:endParaRPr lang="en-US" altLang="ko-KR" sz="3200" b="1">
+              <a:solidFill>
+                <a:schemeClr val="tx1"/>
+              </a:solidFill>
+            </a:endParaRPr>
+          </a:p>
+          <a:p>
+            <a:pPr algn="l" eaLnBrk="1" hangingPunct="1"/>
+            <a:br>
+              <a:rPr lang="en-US" altLang="ko-KR" sz="1800" b="1">
+                <a:solidFill>
+                  <a:schemeClr val="tx1"/>
+                </a:solidFill>
+              </a:rPr>
+            </a:br>
+            <a:r>
+              <a:rPr lang="en-US" altLang="ko-KR" sz="1800" b="1">
+                <a:solidFill>
+                  <a:schemeClr val="tx1"/>
+                </a:solidFill>
+              </a:rPr>
+              <a:t>- </a:t>
+            </a:r>
+            <a:r>
+              <a:rPr lang="ko-KR" altLang="en-US" sz="1800" b="1">
+                <a:solidFill>
+                  <a:schemeClr val="tx1"/>
+                </a:solidFill>
+              </a:rPr>
+              <a:t>흐름 제어에서 </a:t>
+            </a:r>
+            <a:r>
+              <a:rPr lang="en-US" altLang="ko-KR" sz="1800" b="1">
+                <a:solidFill>
+                  <a:schemeClr val="tx1"/>
+                </a:solidFill>
+              </a:rPr>
+              <a:t>11-12</a:t>
+            </a:r>
+            <a:r>
+              <a:rPr lang="ko-KR" altLang="en-US" sz="1800" b="1">
+                <a:solidFill>
+                  <a:schemeClr val="tx1"/>
+                </a:solidFill>
+              </a:rPr>
+              <a:t>주차에서 다룬 </a:t>
+            </a:r>
+            <a:r>
+              <a:rPr lang="en-US" altLang="ko-KR" sz="1800" b="1">
+                <a:solidFill>
+                  <a:schemeClr val="tx1"/>
+                </a:solidFill>
+              </a:rPr>
+              <a:t>‘</a:t>
+            </a:r>
+            <a:r>
+              <a:rPr lang="ko-KR" altLang="en-US" sz="1800" b="1">
+                <a:solidFill>
+                  <a:schemeClr val="tx1"/>
+                </a:solidFill>
+              </a:rPr>
+              <a:t>연결 관리</a:t>
+            </a:r>
+            <a:r>
+              <a:rPr lang="en-US" altLang="ko-KR" sz="1800" b="1">
+                <a:solidFill>
+                  <a:schemeClr val="tx1"/>
+                </a:solidFill>
+              </a:rPr>
+              <a:t>’</a:t>
+            </a:r>
+            <a:r>
+              <a:rPr lang="ko-KR" altLang="en-US" sz="1800" b="1">
+                <a:solidFill>
+                  <a:schemeClr val="tx1"/>
+                </a:solidFill>
+              </a:rPr>
+              <a:t>를 제외한 내용</a:t>
+            </a:r>
+            <a:br>
+              <a:rPr lang="en-US" altLang="ko-KR" sz="1800" b="1">
+                <a:solidFill>
+                  <a:schemeClr val="tx1"/>
+                </a:solidFill>
+              </a:rPr>
+            </a:br>
+            <a:r>
+              <a:rPr lang="en-US" altLang="ko-KR" sz="1800" b="1">
+                <a:solidFill>
+                  <a:schemeClr val="tx1"/>
+                </a:solidFill>
+              </a:rPr>
+              <a:t>- </a:t>
+            </a:r>
+            <a:r>
+              <a:rPr lang="ko-KR" altLang="en-US" sz="1800" b="1">
+                <a:solidFill>
+                  <a:schemeClr val="tx1"/>
+                </a:solidFill>
+              </a:rPr>
+              <a:t>오류 제어와 혼잡 제어의 차이 구별</a:t>
+            </a:r>
+            <a:br>
+              <a:rPr lang="en-US" altLang="ko-KR" sz="1800" b="1">
+                <a:solidFill>
+                  <a:schemeClr val="tx1"/>
+                </a:solidFill>
+              </a:rPr>
+            </a:br>
+            <a:r>
+              <a:rPr lang="en-US" altLang="ko-KR" sz="1800" b="1">
+                <a:solidFill>
+                  <a:schemeClr val="tx1"/>
+                </a:solidFill>
+              </a:rPr>
+              <a:t>- </a:t>
+            </a:r>
+            <a:r>
+              <a:rPr lang="ko-KR" altLang="en-US" sz="1800" b="1">
+                <a:solidFill>
+                  <a:schemeClr val="tx1"/>
+                </a:solidFill>
+              </a:rPr>
+              <a:t>오류 제어와 혼잡 제어의 연결성</a:t>
+            </a:r>
+            <a:endParaRPr lang="en-US" altLang="ko-KR" sz="1800" b="1">
+              <a:solidFill>
+                <a:schemeClr val="tx1"/>
+              </a:solidFill>
+            </a:endParaRPr>
+          </a:p>
+        </p:txBody>
+      </p:sp>
+      <p:cxnSp>
+        <p:nvCxnSpPr>
+          <p:cNvPr id="6" name="직선 연결선 5">
+            <a:extLst>
+              <a:ext uri="{FF2B5EF4-FFF2-40B4-BE49-F238E27FC236}">
+                <a16:creationId xmlns:a16="http://schemas.microsoft.com/office/drawing/2014/main" id="{E3135BB5-4815-CB24-8904-8EDCB86FBD6C}"/>
+              </a:ext>
+            </a:extLst>
+          </p:cNvPr>
+          <p:cNvCxnSpPr/>
+          <p:nvPr/>
+        </p:nvCxnSpPr>
+        <p:spPr bwMode="auto">
+          <a:xfrm>
+            <a:off x="606082" y="4514396"/>
+            <a:ext cx="7422302" cy="0"/>
+          </a:xfrm>
+          <a:prstGeom prst="line">
+            <a:avLst/>
+          </a:prstGeom>
+          <a:solidFill>
+            <a:schemeClr val="accent1"/>
+          </a:solidFill>
+          <a:ln w="9525" cap="flat" cmpd="sng" algn="ctr">
+            <a:solidFill>
+              <a:schemeClr val="tx1"/>
+            </a:solidFill>
+            <a:prstDash val="solid"/>
+            <a:round/>
+            <a:headEnd type="none" w="med" len="med"/>
+            <a:tailEnd type="none" w="med" len="med"/>
+          </a:ln>
+          <a:effectLst/>
+          <a:extLst>
+            <a:ext uri="{AF507438-7753-43E0-B8FC-AC1667EBCBE1}">
+              <a14:hiddenEffects xmlns:a14="http://schemas.microsoft.com/office/drawing/2010/main">
+                <a:effectLst>
+                  <a:outerShdw dist="35921" dir="2700000" algn="ctr" rotWithShape="0">
+                    <a:schemeClr val="bg2"/>
+                  </a:outerShdw>
+                </a:effectLst>
+              </a14:hiddenEffects>
+            </a:ext>
+          </a:extLst>
+        </p:spPr>
+      </p:cxnSp>
     </p:spTree>
   </p:cSld>
   <p:clrMapOvr>
@@ -13794,7 +15318,7 @@
     </p:spTree>
     <p:extLst>
       <p:ext uri="{BB962C8B-B14F-4D97-AF65-F5344CB8AC3E}">
-        <p14:creationId xmlns:p14="http://schemas.microsoft.com/office/powerpoint/2010/main" val="1906587838"/>
+        <p14:creationId xmlns:p14="http://schemas.microsoft.com/office/powerpoint/2010/main" val="3079950990"/>
       </p:ext>
     </p:extLst>
   </p:cSld>
@@ -15308,7 +16832,7 @@
             </a:lvl9pPr>
           </a:lstStyle>
           <a:p>
-            <a:pPr marL="180000" indent="-457200" eaLnBrk="1" hangingPunct="1">
+            <a:pPr indent="-457200" eaLnBrk="1" hangingPunct="1">
               <a:spcBef>
                 <a:spcPct val="0"/>
               </a:spcBef>
@@ -15374,7 +16898,7 @@
             </a:r>
           </a:p>
           <a:p>
-            <a:pPr marL="180000" indent="-457200" eaLnBrk="1" hangingPunct="1">
+            <a:pPr indent="-457200" eaLnBrk="1" hangingPunct="1">
               <a:spcBef>
                 <a:spcPct val="0"/>
               </a:spcBef>
@@ -15389,7 +16913,7 @@
             </a:endParaRPr>
           </a:p>
           <a:p>
-            <a:pPr marL="180000" indent="-457200" eaLnBrk="1" hangingPunct="1">
+            <a:pPr indent="-457200" eaLnBrk="1" hangingPunct="1">
               <a:spcBef>
                 <a:spcPct val="0"/>
               </a:spcBef>
@@ -15447,7 +16971,7 @@
             </a:r>
           </a:p>
           <a:p>
-            <a:pPr marL="180000" indent="-457200" eaLnBrk="1" hangingPunct="1">
+            <a:pPr indent="-457200" eaLnBrk="1" hangingPunct="1">
               <a:spcBef>
                 <a:spcPct val="0"/>
               </a:spcBef>
@@ -15462,7 +16986,7 @@
             </a:endParaRPr>
           </a:p>
           <a:p>
-            <a:pPr marL="180000" indent="-457200" eaLnBrk="1" hangingPunct="1">
+            <a:pPr indent="-457200" eaLnBrk="1" hangingPunct="1">
               <a:spcBef>
                 <a:spcPct val="0"/>
               </a:spcBef>
@@ -15516,7 +17040,7 @@
             </a:endParaRPr>
           </a:p>
           <a:p>
-            <a:pPr marL="180000" indent="-457200" eaLnBrk="1" hangingPunct="1">
+            <a:pPr indent="-457200" eaLnBrk="1" hangingPunct="1">
               <a:spcBef>
                 <a:spcPct val="0"/>
               </a:spcBef>
@@ -15531,7 +17055,7 @@
             </a:endParaRPr>
           </a:p>
           <a:p>
-            <a:pPr marL="180000" indent="-457200" eaLnBrk="1" hangingPunct="1">
+            <a:pPr indent="-457200" eaLnBrk="1" hangingPunct="1">
               <a:spcBef>
                 <a:spcPct val="0"/>
               </a:spcBef>
@@ -15569,7 +17093,7 @@
             </a:r>
           </a:p>
           <a:p>
-            <a:pPr marL="180000" indent="-457200" eaLnBrk="1" hangingPunct="1">
+            <a:pPr indent="-457200" eaLnBrk="1" hangingPunct="1">
               <a:spcBef>
                 <a:spcPct val="0"/>
               </a:spcBef>
@@ -16897,7 +18421,7 @@
                 <a:latin typeface="맑은 고딕" panose="020B0503020000020004" pitchFamily="50" charset="-127"/>
                 <a:ea typeface="맑은 고딕" panose="020B0503020000020004" pitchFamily="50" charset="-127"/>
               </a:rPr>
-              <a:t>전송된 순서대로 전달된다</a:t>
+              <a:t>전송된 순서대로 애플리케이션에게 전달된다</a:t>
             </a:r>
             <a:r>
               <a:rPr lang="en-US" altLang="ko-KR" sz="1400">
@@ -17160,36 +18684,114 @@
           </a:p>
         </p:txBody>
       </p:sp>
-      <p:pic>
-        <p:nvPicPr>
-          <p:cNvPr id="4" name="그림 3">
+      <p:grpSp>
+        <p:nvGrpSpPr>
+          <p:cNvPr id="2" name="그룹 1">
             <a:extLst>
               <a:ext uri="{FF2B5EF4-FFF2-40B4-BE49-F238E27FC236}">
-                <a16:creationId xmlns:a16="http://schemas.microsoft.com/office/drawing/2014/main" id="{1312E6B5-9B28-7BA9-02BE-E85E9CFBC8CC}"/>
+                <a16:creationId xmlns:a16="http://schemas.microsoft.com/office/drawing/2014/main" id="{8D5E9CCA-9105-4953-576D-F92050198640}"/>
               </a:ext>
             </a:extLst>
           </p:cNvPr>
-          <p:cNvPicPr>
-            <a:picLocks noChangeAspect="1"/>
-          </p:cNvPicPr>
+          <p:cNvGrpSpPr/>
           <p:nvPr/>
-        </p:nvPicPr>
-        <p:blipFill>
-          <a:blip r:embed="rId2"/>
-          <a:stretch>
-            <a:fillRect/>
-          </a:stretch>
-        </p:blipFill>
-        <p:spPr>
+        </p:nvGrpSpPr>
+        <p:grpSpPr>
           <a:xfrm>
-            <a:off x="0" y="2789339"/>
-            <a:ext cx="9144000" cy="4068661"/>
+            <a:off x="3131840" y="2789339"/>
+            <a:ext cx="2555776" cy="4068661"/>
+            <a:chOff x="0" y="2789339"/>
+            <a:chExt cx="2555776" cy="4068661"/>
           </a:xfrm>
-          <a:prstGeom prst="rect">
-            <a:avLst/>
-          </a:prstGeom>
-        </p:spPr>
-      </p:pic>
+        </p:grpSpPr>
+        <p:pic>
+          <p:nvPicPr>
+            <p:cNvPr id="4" name="그림 3">
+              <a:extLst>
+                <a:ext uri="{FF2B5EF4-FFF2-40B4-BE49-F238E27FC236}">
+                  <a16:creationId xmlns:a16="http://schemas.microsoft.com/office/drawing/2014/main" id="{1312E6B5-9B28-7BA9-02BE-E85E9CFBC8CC}"/>
+                </a:ext>
+              </a:extLst>
+            </p:cNvPr>
+            <p:cNvPicPr>
+              <a:picLocks noChangeAspect="1"/>
+            </p:cNvPicPr>
+            <p:nvPr/>
+          </p:nvPicPr>
+          <p:blipFill rotWithShape="1">
+            <a:blip r:embed="rId2"/>
+            <a:srcRect r="72050" b="27644"/>
+            <a:stretch/>
+          </p:blipFill>
+          <p:spPr>
+            <a:xfrm>
+              <a:off x="0" y="2789339"/>
+              <a:ext cx="2555776" cy="2943917"/>
+            </a:xfrm>
+            <a:prstGeom prst="rect">
+              <a:avLst/>
+            </a:prstGeom>
+          </p:spPr>
+        </p:pic>
+        <p:pic>
+          <p:nvPicPr>
+            <p:cNvPr id="7" name="그림 6">
+              <a:extLst>
+                <a:ext uri="{FF2B5EF4-FFF2-40B4-BE49-F238E27FC236}">
+                  <a16:creationId xmlns:a16="http://schemas.microsoft.com/office/drawing/2014/main" id="{BF5AA40D-8DFA-8C79-482A-236E33877A2E}"/>
+                </a:ext>
+              </a:extLst>
+            </p:cNvPr>
+            <p:cNvPicPr>
+              <a:picLocks noChangeAspect="1"/>
+            </p:cNvPicPr>
+            <p:nvPr/>
+          </p:nvPicPr>
+          <p:blipFill rotWithShape="1">
+            <a:blip r:embed="rId2"/>
+            <a:srcRect t="72356" r="95000"/>
+            <a:stretch/>
+          </p:blipFill>
+          <p:spPr>
+            <a:xfrm>
+              <a:off x="0" y="5733256"/>
+              <a:ext cx="457200" cy="1124744"/>
+            </a:xfrm>
+            <a:prstGeom prst="rect">
+              <a:avLst/>
+            </a:prstGeom>
+          </p:spPr>
+        </p:pic>
+        <p:pic>
+          <p:nvPicPr>
+            <p:cNvPr id="9" name="그림 8">
+              <a:extLst>
+                <a:ext uri="{FF2B5EF4-FFF2-40B4-BE49-F238E27FC236}">
+                  <a16:creationId xmlns:a16="http://schemas.microsoft.com/office/drawing/2014/main" id="{1218D551-5BE6-03BC-3A78-4CECBBEAFA5C}"/>
+                </a:ext>
+              </a:extLst>
+            </p:cNvPr>
+            <p:cNvPicPr>
+              <a:picLocks noChangeAspect="1"/>
+            </p:cNvPicPr>
+            <p:nvPr/>
+          </p:nvPicPr>
+          <p:blipFill rotWithShape="1">
+            <a:blip r:embed="rId2"/>
+            <a:srcRect l="50000" t="72356" r="44487" b="20564"/>
+            <a:stretch/>
+          </p:blipFill>
+          <p:spPr>
+            <a:xfrm>
+              <a:off x="1277888" y="5733257"/>
+              <a:ext cx="504056" cy="288032"/>
+            </a:xfrm>
+            <a:prstGeom prst="rect">
+              <a:avLst/>
+            </a:prstGeom>
+          </p:spPr>
+        </p:pic>
+      </p:grpSp>
     </p:spTree>
     <p:extLst>
       <p:ext uri="{BB962C8B-B14F-4D97-AF65-F5344CB8AC3E}">
@@ -17204,6 +18806,186 @@
 </file>
 
 <file path=ppt/slides/slide8.xml><?xml version="1.0" encoding="utf-8"?>
+<p:sld xmlns:a="http://schemas.openxmlformats.org/drawingml/2006/main" xmlns:r="http://schemas.openxmlformats.org/officeDocument/2006/relationships" xmlns:p="http://schemas.openxmlformats.org/presentationml/2006/main">
+  <p:cSld>
+    <p:spTree>
+      <p:nvGrpSpPr>
+        <p:cNvPr id="1" name=""/>
+        <p:cNvGrpSpPr/>
+        <p:nvPr/>
+      </p:nvGrpSpPr>
+      <p:grpSpPr>
+        <a:xfrm>
+          <a:off x="0" y="0"/>
+          <a:ext cx="0" cy="0"/>
+          <a:chOff x="0" y="0"/>
+          <a:chExt cx="0" cy="0"/>
+        </a:xfrm>
+      </p:grpSpPr>
+      <p:sp>
+        <p:nvSpPr>
+          <p:cNvPr id="5122" name="Rectangle 2">
+            <a:extLst>
+              <a:ext uri="{FF2B5EF4-FFF2-40B4-BE49-F238E27FC236}">
+                <a16:creationId xmlns:a16="http://schemas.microsoft.com/office/drawing/2014/main" id="{5A5441BC-21C9-4C4E-8617-73A39EC832C7}"/>
+              </a:ext>
+            </a:extLst>
+          </p:cNvPr>
+          <p:cNvSpPr>
+            <a:spLocks noGrp="1" noChangeArrowheads="1"/>
+          </p:cNvSpPr>
+          <p:nvPr>
+            <p:ph type="title"/>
+          </p:nvPr>
+        </p:nvSpPr>
+        <p:spPr>
+          <a:xfrm>
+            <a:off x="457200" y="188913"/>
+            <a:ext cx="8229600" cy="1295400"/>
+          </a:xfrm>
+        </p:spPr>
+        <p:txBody>
+          <a:bodyPr/>
+          <a:lstStyle/>
+          <a:p>
+            <a:pPr algn="l" eaLnBrk="1" hangingPunct="1">
+              <a:defRPr/>
+            </a:pPr>
+            <a:r>
+              <a:rPr lang="ko-KR" altLang="en-US" sz="3200">
+                <a:solidFill>
+                  <a:schemeClr val="tx1"/>
+                </a:solidFill>
+              </a:rPr>
+              <a:t>신뢰성 있는 데이터 전송의 원리</a:t>
+            </a:r>
+            <a:endParaRPr lang="ko-KR" altLang="ko-KR" sz="2000">
+              <a:solidFill>
+                <a:schemeClr val="tx1"/>
+              </a:solidFill>
+            </a:endParaRPr>
+          </a:p>
+        </p:txBody>
+      </p:sp>
+      <p:cxnSp>
+        <p:nvCxnSpPr>
+          <p:cNvPr id="3" name="직선 연결선 2">
+            <a:extLst>
+              <a:ext uri="{FF2B5EF4-FFF2-40B4-BE49-F238E27FC236}">
+                <a16:creationId xmlns:a16="http://schemas.microsoft.com/office/drawing/2014/main" id="{00016A16-78F9-4CDB-B5A3-E7D1D56285D2}"/>
+              </a:ext>
+            </a:extLst>
+          </p:cNvPr>
+          <p:cNvCxnSpPr/>
+          <p:nvPr/>
+        </p:nvCxnSpPr>
+        <p:spPr bwMode="auto">
+          <a:xfrm>
+            <a:off x="575556" y="1268760"/>
+            <a:ext cx="7992888" cy="0"/>
+          </a:xfrm>
+          <a:prstGeom prst="line">
+            <a:avLst/>
+          </a:prstGeom>
+          <a:solidFill>
+            <a:schemeClr val="accent1"/>
+          </a:solidFill>
+          <a:ln w="25400" cap="flat" cmpd="sng" algn="ctr">
+            <a:solidFill>
+              <a:schemeClr val="tx1"/>
+            </a:solidFill>
+            <a:prstDash val="solid"/>
+            <a:round/>
+            <a:headEnd type="none" w="med" len="med"/>
+            <a:tailEnd type="none" w="med" len="med"/>
+          </a:ln>
+          <a:effectLst/>
+          <a:extLst>
+            <a:ext uri="{AF507438-7753-43E0-B8FC-AC1667EBCBE1}">
+              <a14:hiddenEffects xmlns:a14="http://schemas.microsoft.com/office/drawing/2010/main">
+                <a:effectLst>
+                  <a:outerShdw dist="35921" dir="2700000" algn="ctr" rotWithShape="0">
+                    <a:schemeClr val="bg2"/>
+                  </a:outerShdw>
+                </a:effectLst>
+              </a14:hiddenEffects>
+            </a:ext>
+          </a:extLst>
+        </p:spPr>
+      </p:cxnSp>
+      <p:pic>
+        <p:nvPicPr>
+          <p:cNvPr id="7" name="그림 6">
+            <a:extLst>
+              <a:ext uri="{FF2B5EF4-FFF2-40B4-BE49-F238E27FC236}">
+                <a16:creationId xmlns:a16="http://schemas.microsoft.com/office/drawing/2014/main" id="{27D72501-CC26-2FFF-240B-4DDB6802A2DB}"/>
+              </a:ext>
+            </a:extLst>
+          </p:cNvPr>
+          <p:cNvPicPr>
+            <a:picLocks noChangeAspect="1"/>
+          </p:cNvPicPr>
+          <p:nvPr/>
+        </p:nvPicPr>
+        <p:blipFill rotWithShape="1">
+          <a:blip r:embed="rId2"/>
+          <a:srcRect r="94099"/>
+          <a:stretch/>
+        </p:blipFill>
+        <p:spPr>
+          <a:xfrm>
+            <a:off x="172327" y="1470680"/>
+            <a:ext cx="655257" cy="4860978"/>
+          </a:xfrm>
+          <a:prstGeom prst="rect">
+            <a:avLst/>
+          </a:prstGeom>
+        </p:spPr>
+      </p:pic>
+      <p:pic>
+        <p:nvPicPr>
+          <p:cNvPr id="5" name="그림 4">
+            <a:extLst>
+              <a:ext uri="{FF2B5EF4-FFF2-40B4-BE49-F238E27FC236}">
+                <a16:creationId xmlns:a16="http://schemas.microsoft.com/office/drawing/2014/main" id="{87070C16-CE7F-7CD4-AE3E-0EB2F6A32F3E}"/>
+              </a:ext>
+            </a:extLst>
+          </p:cNvPr>
+          <p:cNvPicPr>
+            <a:picLocks noChangeAspect="1"/>
+          </p:cNvPicPr>
+          <p:nvPr/>
+        </p:nvPicPr>
+        <p:blipFill>
+          <a:blip r:embed="rId3"/>
+          <a:stretch>
+            <a:fillRect/>
+          </a:stretch>
+        </p:blipFill>
+        <p:spPr>
+          <a:xfrm>
+            <a:off x="827584" y="1470680"/>
+            <a:ext cx="8140214" cy="4896544"/>
+          </a:xfrm>
+          <a:prstGeom prst="rect">
+            <a:avLst/>
+          </a:prstGeom>
+        </p:spPr>
+      </p:pic>
+    </p:spTree>
+    <p:extLst>
+      <p:ext uri="{BB962C8B-B14F-4D97-AF65-F5344CB8AC3E}">
+        <p14:creationId xmlns:p14="http://schemas.microsoft.com/office/powerpoint/2010/main" val="2647336456"/>
+      </p:ext>
+    </p:extLst>
+  </p:cSld>
+  <p:clrMapOvr>
+    <a:masterClrMapping/>
+  </p:clrMapOvr>
+</p:sld>
+</file>
+
+<file path=ppt/slides/slide9.xml><?xml version="1.0" encoding="utf-8"?>
 <p:sld xmlns:a="http://schemas.openxmlformats.org/drawingml/2006/main" xmlns:r="http://schemas.openxmlformats.org/officeDocument/2006/relationships" xmlns:p="http://schemas.openxmlformats.org/presentationml/2006/main">
   <p:cSld>
     <p:spTree>
@@ -18844,1257 +20626,6 @@
       <p:bldP spid="9" grpId="0"/>
     </p:bldLst>
   </p:timing>
-</p:sld>
-</file>
-
-<file path=ppt/slides/slide9.xml><?xml version="1.0" encoding="utf-8"?>
-<p:sld xmlns:a="http://schemas.openxmlformats.org/drawingml/2006/main" xmlns:r="http://schemas.openxmlformats.org/officeDocument/2006/relationships" xmlns:p="http://schemas.openxmlformats.org/presentationml/2006/main">
-  <p:cSld>
-    <p:spTree>
-      <p:nvGrpSpPr>
-        <p:cNvPr id="1" name=""/>
-        <p:cNvGrpSpPr/>
-        <p:nvPr/>
-      </p:nvGrpSpPr>
-      <p:grpSpPr>
-        <a:xfrm>
-          <a:off x="0" y="0"/>
-          <a:ext cx="0" cy="0"/>
-          <a:chOff x="0" y="0"/>
-          <a:chExt cx="0" cy="0"/>
-        </a:xfrm>
-      </p:grpSpPr>
-      <p:sp>
-        <p:nvSpPr>
-          <p:cNvPr id="5122" name="Rectangle 2">
-            <a:extLst>
-              <a:ext uri="{FF2B5EF4-FFF2-40B4-BE49-F238E27FC236}">
-                <a16:creationId xmlns:a16="http://schemas.microsoft.com/office/drawing/2014/main" id="{5A5441BC-21C9-4C4E-8617-73A39EC832C7}"/>
-              </a:ext>
-            </a:extLst>
-          </p:cNvPr>
-          <p:cNvSpPr>
-            <a:spLocks noGrp="1" noChangeArrowheads="1"/>
-          </p:cNvSpPr>
-          <p:nvPr>
-            <p:ph type="title"/>
-          </p:nvPr>
-        </p:nvSpPr>
-        <p:spPr>
-          <a:xfrm>
-            <a:off x="457200" y="188913"/>
-            <a:ext cx="8229600" cy="1295400"/>
-          </a:xfrm>
-        </p:spPr>
-        <p:txBody>
-          <a:bodyPr/>
-          <a:lstStyle/>
-          <a:p>
-            <a:pPr algn="l" eaLnBrk="1" hangingPunct="1">
-              <a:defRPr/>
-            </a:pPr>
-            <a:r>
-              <a:rPr lang="ko-KR" altLang="en-US" sz="3200">
-                <a:solidFill>
-                  <a:schemeClr val="tx1"/>
-                </a:solidFill>
-              </a:rPr>
-              <a:t>파이프라인 오류 회복</a:t>
-            </a:r>
-            <a:endParaRPr lang="ko-KR" altLang="ko-KR" sz="2000">
-              <a:solidFill>
-                <a:schemeClr val="tx1"/>
-              </a:solidFill>
-            </a:endParaRPr>
-          </a:p>
-        </p:txBody>
-      </p:sp>
-      <p:cxnSp>
-        <p:nvCxnSpPr>
-          <p:cNvPr id="3" name="직선 연결선 2">
-            <a:extLst>
-              <a:ext uri="{FF2B5EF4-FFF2-40B4-BE49-F238E27FC236}">
-                <a16:creationId xmlns:a16="http://schemas.microsoft.com/office/drawing/2014/main" id="{00016A16-78F9-4CDB-B5A3-E7D1D56285D2}"/>
-              </a:ext>
-            </a:extLst>
-          </p:cNvPr>
-          <p:cNvCxnSpPr/>
-          <p:nvPr/>
-        </p:nvCxnSpPr>
-        <p:spPr bwMode="auto">
-          <a:xfrm>
-            <a:off x="575556" y="1268760"/>
-            <a:ext cx="7992888" cy="0"/>
-          </a:xfrm>
-          <a:prstGeom prst="line">
-            <a:avLst/>
-          </a:prstGeom>
-          <a:solidFill>
-            <a:schemeClr val="accent1"/>
-          </a:solidFill>
-          <a:ln w="25400" cap="flat" cmpd="sng" algn="ctr">
-            <a:solidFill>
-              <a:schemeClr val="tx1"/>
-            </a:solidFill>
-            <a:prstDash val="solid"/>
-            <a:round/>
-            <a:headEnd type="none" w="med" len="med"/>
-            <a:tailEnd type="none" w="med" len="med"/>
-          </a:ln>
-          <a:effectLst/>
-          <a:extLst>
-            <a:ext uri="{AF507438-7753-43E0-B8FC-AC1667EBCBE1}">
-              <a14:hiddenEffects xmlns:a14="http://schemas.microsoft.com/office/drawing/2010/main">
-                <a:effectLst>
-                  <a:outerShdw dist="35921" dir="2700000" algn="ctr" rotWithShape="0">
-                    <a:schemeClr val="bg2"/>
-                  </a:outerShdw>
-                </a:effectLst>
-              </a14:hiddenEffects>
-            </a:ext>
-          </a:extLst>
-        </p:spPr>
-      </p:cxnSp>
-      <p:graphicFrame>
-        <p:nvGraphicFramePr>
-          <p:cNvPr id="6" name="표 5">
-            <a:extLst>
-              <a:ext uri="{FF2B5EF4-FFF2-40B4-BE49-F238E27FC236}">
-                <a16:creationId xmlns:a16="http://schemas.microsoft.com/office/drawing/2014/main" id="{90B15DFD-83BF-4B89-9642-B09B029F1A94}"/>
-              </a:ext>
-            </a:extLst>
-          </p:cNvPr>
-          <p:cNvGraphicFramePr>
-            <a:graphicFrameLocks noGrp="1"/>
-          </p:cNvGraphicFramePr>
-          <p:nvPr>
-            <p:extLst>
-              <p:ext uri="{D42A27DB-BD31-4B8C-83A1-F6EECF244321}">
-                <p14:modId xmlns:p14="http://schemas.microsoft.com/office/powerpoint/2010/main" val="21336533"/>
-              </p:ext>
-            </p:extLst>
-          </p:nvPr>
-        </p:nvGraphicFramePr>
-        <p:xfrm>
-          <a:off x="143508" y="1412777"/>
-          <a:ext cx="8856984" cy="3937000"/>
-        </p:xfrm>
-        <a:graphic>
-          <a:graphicData uri="http://schemas.openxmlformats.org/drawingml/2006/table">
-            <a:tbl>
-              <a:tblPr firstRow="1" bandRow="1">
-                <a:tableStyleId>{5C22544A-7EE6-4342-B048-85BDC9FD1C3A}</a:tableStyleId>
-              </a:tblPr>
-              <a:tblGrid>
-                <a:gridCol w="720080">
-                  <a:extLst>
-                    <a:ext uri="{9D8B030D-6E8A-4147-A177-3AD203B41FA5}">
-                      <a16:colId xmlns:a16="http://schemas.microsoft.com/office/drawing/2014/main" val="1315739539"/>
-                    </a:ext>
-                  </a:extLst>
-                </a:gridCol>
-                <a:gridCol w="4068452">
-                  <a:extLst>
-                    <a:ext uri="{9D8B030D-6E8A-4147-A177-3AD203B41FA5}">
-                      <a16:colId xmlns:a16="http://schemas.microsoft.com/office/drawing/2014/main" val="819310429"/>
-                    </a:ext>
-                  </a:extLst>
-                </a:gridCol>
-                <a:gridCol w="4068452">
-                  <a:extLst>
-                    <a:ext uri="{9D8B030D-6E8A-4147-A177-3AD203B41FA5}">
-                      <a16:colId xmlns:a16="http://schemas.microsoft.com/office/drawing/2014/main" val="3254816515"/>
-                    </a:ext>
-                  </a:extLst>
-                </a:gridCol>
-              </a:tblGrid>
-              <a:tr h="370840">
-                <a:tc>
-                  <a:txBody>
-                    <a:bodyPr/>
-                    <a:lstStyle/>
-                    <a:p>
-                      <a:pPr latinLnBrk="1"/>
-                      <a:endParaRPr lang="ko-KR" altLang="en-US">
-                        <a:solidFill>
-                          <a:schemeClr val="tx1"/>
-                        </a:solidFill>
-                      </a:endParaRPr>
-                    </a:p>
-                  </a:txBody>
-                  <a:tcPr>
-                    <a:lnL w="12700" cap="flat" cmpd="sng" algn="ctr">
-                      <a:solidFill>
-                        <a:schemeClr val="tx1"/>
-                      </a:solidFill>
-                      <a:prstDash val="solid"/>
-                      <a:round/>
-                      <a:headEnd type="none" w="med" len="med"/>
-                      <a:tailEnd type="none" w="med" len="med"/>
-                    </a:lnL>
-                    <a:lnR w="12700" cap="flat" cmpd="sng" algn="ctr">
-                      <a:solidFill>
-                        <a:schemeClr val="tx1"/>
-                      </a:solidFill>
-                      <a:prstDash val="solid"/>
-                      <a:round/>
-                      <a:headEnd type="none" w="med" len="med"/>
-                      <a:tailEnd type="none" w="med" len="med"/>
-                    </a:lnR>
-                    <a:lnT w="12700" cap="flat" cmpd="sng" algn="ctr">
-                      <a:solidFill>
-                        <a:schemeClr val="tx1"/>
-                      </a:solidFill>
-                      <a:prstDash val="solid"/>
-                      <a:round/>
-                      <a:headEnd type="none" w="med" len="med"/>
-                      <a:tailEnd type="none" w="med" len="med"/>
-                    </a:lnT>
-                    <a:lnB w="12700" cap="flat" cmpd="sng" algn="ctr">
-                      <a:solidFill>
-                        <a:schemeClr val="tx1"/>
-                      </a:solidFill>
-                      <a:prstDash val="solid"/>
-                      <a:round/>
-                      <a:headEnd type="none" w="med" len="med"/>
-                      <a:tailEnd type="none" w="med" len="med"/>
-                    </a:lnB>
-                    <a:noFill/>
-                  </a:tcPr>
-                </a:tc>
-                <a:tc>
-                  <a:txBody>
-                    <a:bodyPr/>
-                    <a:lstStyle/>
-                    <a:p>
-                      <a:pPr latinLnBrk="1"/>
-                      <a:r>
-                        <a:rPr lang="en-US" altLang="ko-KR">
-                          <a:solidFill>
-                            <a:schemeClr val="tx1"/>
-                          </a:solidFill>
-                        </a:rPr>
-                        <a:t>Go-Back-n</a:t>
-                      </a:r>
-                      <a:endParaRPr lang="ko-KR" altLang="en-US">
-                        <a:solidFill>
-                          <a:schemeClr val="tx1"/>
-                        </a:solidFill>
-                      </a:endParaRPr>
-                    </a:p>
-                  </a:txBody>
-                  <a:tcPr>
-                    <a:lnL w="12700" cap="flat" cmpd="sng" algn="ctr">
-                      <a:solidFill>
-                        <a:schemeClr val="tx1"/>
-                      </a:solidFill>
-                      <a:prstDash val="solid"/>
-                      <a:round/>
-                      <a:headEnd type="none" w="med" len="med"/>
-                      <a:tailEnd type="none" w="med" len="med"/>
-                    </a:lnL>
-                    <a:lnR w="12700" cap="flat" cmpd="sng" algn="ctr">
-                      <a:solidFill>
-                        <a:schemeClr val="tx1"/>
-                      </a:solidFill>
-                      <a:prstDash val="solid"/>
-                      <a:round/>
-                      <a:headEnd type="none" w="med" len="med"/>
-                      <a:tailEnd type="none" w="med" len="med"/>
-                    </a:lnR>
-                    <a:lnT w="12700" cap="flat" cmpd="sng" algn="ctr">
-                      <a:solidFill>
-                        <a:schemeClr val="tx1"/>
-                      </a:solidFill>
-                      <a:prstDash val="solid"/>
-                      <a:round/>
-                      <a:headEnd type="none" w="med" len="med"/>
-                      <a:tailEnd type="none" w="med" len="med"/>
-                    </a:lnT>
-                    <a:lnB w="12700" cap="flat" cmpd="sng" algn="ctr">
-                      <a:solidFill>
-                        <a:schemeClr val="tx1"/>
-                      </a:solidFill>
-                      <a:prstDash val="solid"/>
-                      <a:round/>
-                      <a:headEnd type="none" w="med" len="med"/>
-                      <a:tailEnd type="none" w="med" len="med"/>
-                    </a:lnB>
-                    <a:noFill/>
-                  </a:tcPr>
-                </a:tc>
-                <a:tc>
-                  <a:txBody>
-                    <a:bodyPr/>
-                    <a:lstStyle/>
-                    <a:p>
-                      <a:pPr latinLnBrk="1"/>
-                      <a:r>
-                        <a:rPr lang="en-US" altLang="ko-KR">
-                          <a:solidFill>
-                            <a:schemeClr val="tx1"/>
-                          </a:solidFill>
-                        </a:rPr>
-                        <a:t>Selective Repeat</a:t>
-                      </a:r>
-                      <a:endParaRPr lang="ko-KR" altLang="en-US">
-                        <a:solidFill>
-                          <a:schemeClr val="tx1"/>
-                        </a:solidFill>
-                      </a:endParaRPr>
-                    </a:p>
-                  </a:txBody>
-                  <a:tcPr>
-                    <a:lnL w="12700" cap="flat" cmpd="sng" algn="ctr">
-                      <a:solidFill>
-                        <a:schemeClr val="tx1"/>
-                      </a:solidFill>
-                      <a:prstDash val="solid"/>
-                      <a:round/>
-                      <a:headEnd type="none" w="med" len="med"/>
-                      <a:tailEnd type="none" w="med" len="med"/>
-                    </a:lnL>
-                    <a:lnR w="12700" cap="flat" cmpd="sng" algn="ctr">
-                      <a:solidFill>
-                        <a:schemeClr val="tx1"/>
-                      </a:solidFill>
-                      <a:prstDash val="solid"/>
-                      <a:round/>
-                      <a:headEnd type="none" w="med" len="med"/>
-                      <a:tailEnd type="none" w="med" len="med"/>
-                    </a:lnR>
-                    <a:lnT w="12700" cap="flat" cmpd="sng" algn="ctr">
-                      <a:solidFill>
-                        <a:schemeClr val="tx1"/>
-                      </a:solidFill>
-                      <a:prstDash val="solid"/>
-                      <a:round/>
-                      <a:headEnd type="none" w="med" len="med"/>
-                      <a:tailEnd type="none" w="med" len="med"/>
-                    </a:lnT>
-                    <a:lnB w="12700" cap="flat" cmpd="sng" algn="ctr">
-                      <a:solidFill>
-                        <a:schemeClr val="tx1"/>
-                      </a:solidFill>
-                      <a:prstDash val="solid"/>
-                      <a:round/>
-                      <a:headEnd type="none" w="med" len="med"/>
-                      <a:tailEnd type="none" w="med" len="med"/>
-                    </a:lnB>
-                    <a:noFill/>
-                  </a:tcPr>
-                </a:tc>
-                <a:extLst>
-                  <a:ext uri="{0D108BD9-81ED-4DB2-BD59-A6C34878D82A}">
-                    <a16:rowId xmlns:a16="http://schemas.microsoft.com/office/drawing/2014/main" val="3349964729"/>
-                  </a:ext>
-                </a:extLst>
-              </a:tr>
-              <a:tr h="370840">
-                <a:tc>
-                  <a:txBody>
-                    <a:bodyPr/>
-                    <a:lstStyle/>
-                    <a:p>
-                      <a:pPr latinLnBrk="1"/>
-                      <a:r>
-                        <a:rPr lang="ko-KR" altLang="en-US">
-                          <a:solidFill>
-                            <a:schemeClr val="tx1"/>
-                          </a:solidFill>
-                        </a:rPr>
-                        <a:t>의미</a:t>
-                      </a:r>
-                    </a:p>
-                  </a:txBody>
-                  <a:tcPr anchor="ctr">
-                    <a:lnL w="12700" cap="flat" cmpd="sng" algn="ctr">
-                      <a:solidFill>
-                        <a:schemeClr val="tx1"/>
-                      </a:solidFill>
-                      <a:prstDash val="solid"/>
-                      <a:round/>
-                      <a:headEnd type="none" w="med" len="med"/>
-                      <a:tailEnd type="none" w="med" len="med"/>
-                    </a:lnL>
-                    <a:lnR w="12700" cap="flat" cmpd="sng" algn="ctr">
-                      <a:solidFill>
-                        <a:schemeClr val="tx1"/>
-                      </a:solidFill>
-                      <a:prstDash val="solid"/>
-                      <a:round/>
-                      <a:headEnd type="none" w="med" len="med"/>
-                      <a:tailEnd type="none" w="med" len="med"/>
-                    </a:lnR>
-                    <a:lnT w="12700" cap="flat" cmpd="sng" algn="ctr">
-                      <a:solidFill>
-                        <a:schemeClr val="tx1"/>
-                      </a:solidFill>
-                      <a:prstDash val="solid"/>
-                      <a:round/>
-                      <a:headEnd type="none" w="med" len="med"/>
-                      <a:tailEnd type="none" w="med" len="med"/>
-                    </a:lnT>
-                    <a:lnB w="12700" cap="flat" cmpd="sng" algn="ctr">
-                      <a:solidFill>
-                        <a:schemeClr val="tx1"/>
-                      </a:solidFill>
-                      <a:prstDash val="solid"/>
-                      <a:round/>
-                      <a:headEnd type="none" w="med" len="med"/>
-                      <a:tailEnd type="none" w="med" len="med"/>
-                    </a:lnB>
-                    <a:noFill/>
-                  </a:tcPr>
-                </a:tc>
-                <a:tc>
-                  <a:txBody>
-                    <a:bodyPr/>
-                    <a:lstStyle/>
-                    <a:p>
-                      <a:r>
-                        <a:rPr lang="ko-KR" altLang="en-US" sz="1800" b="0" kern="1200">
-                          <a:solidFill>
-                            <a:schemeClr val="dk1"/>
-                          </a:solidFill>
-                          <a:effectLst/>
-                          <a:latin typeface="+mn-lt"/>
-                          <a:ea typeface="+mn-ea"/>
-                          <a:cs typeface="+mn-cs"/>
-                        </a:rPr>
-                        <a:t>송신자가 손상되거나 손실된 패킷부터 전송한 지점까지 </a:t>
-                      </a:r>
-                      <a:br>
-                        <a:rPr lang="en-US" altLang="ko-KR" sz="1800" b="0" kern="1200">
-                          <a:solidFill>
-                            <a:schemeClr val="dk1"/>
-                          </a:solidFill>
-                          <a:effectLst/>
-                          <a:latin typeface="+mn-lt"/>
-                          <a:ea typeface="+mn-ea"/>
-                          <a:cs typeface="+mn-cs"/>
-                        </a:rPr>
-                      </a:br>
-                      <a:r>
-                        <a:rPr lang="ko-KR" altLang="en-US" sz="1800" b="0" u="sng" kern="1200">
-                          <a:solidFill>
-                            <a:schemeClr val="dk1"/>
-                          </a:solidFill>
-                          <a:effectLst/>
-                          <a:latin typeface="+mn-lt"/>
-                          <a:ea typeface="+mn-ea"/>
-                          <a:cs typeface="+mn-cs"/>
-                        </a:rPr>
-                        <a:t>순서대로 다시 재전송</a:t>
-                      </a:r>
-                      <a:r>
-                        <a:rPr lang="ko-KR" altLang="en-US" sz="1800" b="0" kern="1200">
-                          <a:solidFill>
-                            <a:schemeClr val="dk1"/>
-                          </a:solidFill>
-                          <a:effectLst/>
-                          <a:latin typeface="+mn-lt"/>
-                          <a:ea typeface="+mn-ea"/>
-                          <a:cs typeface="+mn-cs"/>
-                        </a:rPr>
-                        <a:t>하는 기법이다</a:t>
-                      </a:r>
-                      <a:r>
-                        <a:rPr lang="en-US" altLang="ko-KR" sz="1800" b="0" kern="1200">
-                          <a:solidFill>
-                            <a:schemeClr val="dk1"/>
-                          </a:solidFill>
-                          <a:effectLst/>
-                          <a:latin typeface="+mn-lt"/>
-                          <a:ea typeface="+mn-ea"/>
-                          <a:cs typeface="+mn-cs"/>
-                        </a:rPr>
-                        <a:t>.        </a:t>
-                      </a:r>
-                    </a:p>
-                  </a:txBody>
-                  <a:tcPr>
-                    <a:lnL w="12700" cap="flat" cmpd="sng" algn="ctr">
-                      <a:solidFill>
-                        <a:schemeClr val="tx1"/>
-                      </a:solidFill>
-                      <a:prstDash val="solid"/>
-                      <a:round/>
-                      <a:headEnd type="none" w="med" len="med"/>
-                      <a:tailEnd type="none" w="med" len="med"/>
-                    </a:lnL>
-                    <a:lnR w="12700" cap="flat" cmpd="sng" algn="ctr">
-                      <a:solidFill>
-                        <a:schemeClr val="tx1"/>
-                      </a:solidFill>
-                      <a:prstDash val="solid"/>
-                      <a:round/>
-                      <a:headEnd type="none" w="med" len="med"/>
-                      <a:tailEnd type="none" w="med" len="med"/>
-                    </a:lnR>
-                    <a:lnT w="12700" cap="flat" cmpd="sng" algn="ctr">
-                      <a:solidFill>
-                        <a:schemeClr val="tx1"/>
-                      </a:solidFill>
-                      <a:prstDash val="solid"/>
-                      <a:round/>
-                      <a:headEnd type="none" w="med" len="med"/>
-                      <a:tailEnd type="none" w="med" len="med"/>
-                    </a:lnT>
-                    <a:lnB w="12700" cap="flat" cmpd="sng" algn="ctr">
-                      <a:solidFill>
-                        <a:schemeClr val="tx1"/>
-                      </a:solidFill>
-                      <a:prstDash val="solid"/>
-                      <a:round/>
-                      <a:headEnd type="none" w="med" len="med"/>
-                      <a:tailEnd type="none" w="med" len="med"/>
-                    </a:lnB>
-                    <a:noFill/>
-                  </a:tcPr>
-                </a:tc>
-                <a:tc>
-                  <a:txBody>
-                    <a:bodyPr/>
-                    <a:lstStyle/>
-                    <a:p>
-                      <a:pPr marL="0" marR="0" lvl="0" indent="0" algn="l" defTabSz="914400" rtl="0" eaLnBrk="1" fontAlgn="auto" latinLnBrk="1" hangingPunct="1">
-                        <a:lnSpc>
-                          <a:spcPct val="100000"/>
-                        </a:lnSpc>
-                        <a:spcBef>
-                          <a:spcPts val="0"/>
-                        </a:spcBef>
-                        <a:spcAft>
-                          <a:spcPts val="0"/>
-                        </a:spcAft>
-                        <a:buClrTx/>
-                        <a:buSzTx/>
-                        <a:buFontTx/>
-                        <a:buNone/>
-                        <a:tabLst/>
-                        <a:defRPr/>
-                      </a:pPr>
-                      <a:r>
-                        <a:rPr lang="ko-KR" altLang="en-US" sz="1800" b="0" kern="1200">
-                          <a:solidFill>
-                            <a:schemeClr val="dk1"/>
-                          </a:solidFill>
-                          <a:effectLst/>
-                          <a:latin typeface="+mn-lt"/>
-                          <a:ea typeface="+mn-ea"/>
-                          <a:cs typeface="+mn-cs"/>
-                        </a:rPr>
-                        <a:t>송신자가 </a:t>
-                      </a:r>
-                      <a:r>
-                        <a:rPr lang="ko-KR" altLang="en-US" sz="1800" b="0" u="sng" kern="1200">
-                          <a:solidFill>
-                            <a:schemeClr val="dk1"/>
-                          </a:solidFill>
-                          <a:effectLst/>
-                          <a:latin typeface="+mn-lt"/>
-                          <a:ea typeface="+mn-ea"/>
-                          <a:cs typeface="+mn-cs"/>
-                        </a:rPr>
-                        <a:t>손상되거나 손실된 </a:t>
-                      </a:r>
-                      <a:br>
-                        <a:rPr lang="en-US" altLang="ko-KR" sz="1800" b="0" u="sng" kern="1200">
-                          <a:solidFill>
-                            <a:schemeClr val="dk1"/>
-                          </a:solidFill>
-                          <a:effectLst/>
-                          <a:latin typeface="+mn-lt"/>
-                          <a:ea typeface="+mn-ea"/>
-                          <a:cs typeface="+mn-cs"/>
-                        </a:rPr>
-                      </a:br>
-                      <a:r>
-                        <a:rPr lang="ko-KR" altLang="en-US" sz="1800" b="0" u="sng" kern="1200">
-                          <a:solidFill>
-                            <a:schemeClr val="dk1"/>
-                          </a:solidFill>
-                          <a:effectLst/>
-                          <a:latin typeface="+mn-lt"/>
-                          <a:ea typeface="+mn-ea"/>
-                          <a:cs typeface="+mn-cs"/>
-                        </a:rPr>
-                        <a:t>패킷만 다시 재전송</a:t>
-                      </a:r>
-                      <a:r>
-                        <a:rPr lang="ko-KR" altLang="en-US" sz="1800" b="0" kern="1200">
-                          <a:solidFill>
-                            <a:schemeClr val="dk1"/>
-                          </a:solidFill>
-                          <a:effectLst/>
-                          <a:latin typeface="+mn-lt"/>
-                          <a:ea typeface="+mn-ea"/>
-                          <a:cs typeface="+mn-cs"/>
-                        </a:rPr>
-                        <a:t>하는 기법이다</a:t>
-                      </a:r>
-                      <a:r>
-                        <a:rPr lang="en-US" altLang="ko-KR" sz="1800" b="0" kern="1200">
-                          <a:solidFill>
-                            <a:schemeClr val="dk1"/>
-                          </a:solidFill>
-                          <a:effectLst/>
-                          <a:latin typeface="+mn-lt"/>
-                          <a:ea typeface="+mn-ea"/>
-                          <a:cs typeface="+mn-cs"/>
-                        </a:rPr>
-                        <a:t>.</a:t>
-                      </a:r>
-                    </a:p>
-                  </a:txBody>
-                  <a:tcPr>
-                    <a:lnL w="12700" cap="flat" cmpd="sng" algn="ctr">
-                      <a:solidFill>
-                        <a:schemeClr val="tx1"/>
-                      </a:solidFill>
-                      <a:prstDash val="solid"/>
-                      <a:round/>
-                      <a:headEnd type="none" w="med" len="med"/>
-                      <a:tailEnd type="none" w="med" len="med"/>
-                    </a:lnL>
-                    <a:lnR w="12700" cap="flat" cmpd="sng" algn="ctr">
-                      <a:solidFill>
-                        <a:schemeClr val="tx1"/>
-                      </a:solidFill>
-                      <a:prstDash val="solid"/>
-                      <a:round/>
-                      <a:headEnd type="none" w="med" len="med"/>
-                      <a:tailEnd type="none" w="med" len="med"/>
-                    </a:lnR>
-                    <a:lnT w="12700" cap="flat" cmpd="sng" algn="ctr">
-                      <a:solidFill>
-                        <a:schemeClr val="tx1"/>
-                      </a:solidFill>
-                      <a:prstDash val="solid"/>
-                      <a:round/>
-                      <a:headEnd type="none" w="med" len="med"/>
-                      <a:tailEnd type="none" w="med" len="med"/>
-                    </a:lnT>
-                    <a:lnB w="12700" cap="flat" cmpd="sng" algn="ctr">
-                      <a:solidFill>
-                        <a:schemeClr val="tx1"/>
-                      </a:solidFill>
-                      <a:prstDash val="solid"/>
-                      <a:round/>
-                      <a:headEnd type="none" w="med" len="med"/>
-                      <a:tailEnd type="none" w="med" len="med"/>
-                    </a:lnB>
-                    <a:noFill/>
-                  </a:tcPr>
-                </a:tc>
-                <a:extLst>
-                  <a:ext uri="{0D108BD9-81ED-4DB2-BD59-A6C34878D82A}">
-                    <a16:rowId xmlns:a16="http://schemas.microsoft.com/office/drawing/2014/main" val="2279886379"/>
-                  </a:ext>
-                </a:extLst>
-              </a:tr>
-              <a:tr h="370840">
-                <a:tc>
-                  <a:txBody>
-                    <a:bodyPr/>
-                    <a:lstStyle/>
-                    <a:p>
-                      <a:pPr latinLnBrk="1"/>
-                      <a:r>
-                        <a:rPr lang="ko-KR" altLang="en-US">
-                          <a:solidFill>
-                            <a:schemeClr val="tx1"/>
-                          </a:solidFill>
-                        </a:rPr>
-                        <a:t>장점</a:t>
-                      </a:r>
-                    </a:p>
-                  </a:txBody>
-                  <a:tcPr anchor="ctr">
-                    <a:lnL w="12700" cap="flat" cmpd="sng" algn="ctr">
-                      <a:solidFill>
-                        <a:schemeClr val="tx1"/>
-                      </a:solidFill>
-                      <a:prstDash val="solid"/>
-                      <a:round/>
-                      <a:headEnd type="none" w="med" len="med"/>
-                      <a:tailEnd type="none" w="med" len="med"/>
-                    </a:lnL>
-                    <a:lnR w="12700" cap="flat" cmpd="sng" algn="ctr">
-                      <a:solidFill>
-                        <a:schemeClr val="tx1"/>
-                      </a:solidFill>
-                      <a:prstDash val="solid"/>
-                      <a:round/>
-                      <a:headEnd type="none" w="med" len="med"/>
-                      <a:tailEnd type="none" w="med" len="med"/>
-                    </a:lnR>
-                    <a:lnT w="12700" cap="flat" cmpd="sng" algn="ctr">
-                      <a:solidFill>
-                        <a:schemeClr val="tx1"/>
-                      </a:solidFill>
-                      <a:prstDash val="solid"/>
-                      <a:round/>
-                      <a:headEnd type="none" w="med" len="med"/>
-                      <a:tailEnd type="none" w="med" len="med"/>
-                    </a:lnT>
-                    <a:lnB w="12700" cap="flat" cmpd="sng" algn="ctr">
-                      <a:solidFill>
-                        <a:schemeClr val="tx1"/>
-                      </a:solidFill>
-                      <a:prstDash val="solid"/>
-                      <a:round/>
-                      <a:headEnd type="none" w="med" len="med"/>
-                      <a:tailEnd type="none" w="med" len="med"/>
-                    </a:lnB>
-                    <a:noFill/>
-                  </a:tcPr>
-                </a:tc>
-                <a:tc>
-                  <a:txBody>
-                    <a:bodyPr/>
-                    <a:lstStyle/>
-                    <a:p>
-                      <a:r>
-                        <a:rPr lang="ko-KR" altLang="en-US" sz="1800" b="0" kern="1200">
-                          <a:solidFill>
-                            <a:schemeClr val="dk1"/>
-                          </a:solidFill>
-                          <a:effectLst/>
-                          <a:latin typeface="+mn-lt"/>
-                          <a:ea typeface="+mn-ea"/>
-                          <a:cs typeface="+mn-cs"/>
-                        </a:rPr>
-                        <a:t>수신자 버퍼링이 간단하다</a:t>
-                      </a:r>
-                      <a:r>
-                        <a:rPr lang="en-US" altLang="ko-KR" sz="1800" b="0" kern="1200">
-                          <a:solidFill>
-                            <a:schemeClr val="dk1"/>
-                          </a:solidFill>
-                          <a:effectLst/>
-                          <a:latin typeface="+mn-lt"/>
-                          <a:ea typeface="+mn-ea"/>
-                          <a:cs typeface="+mn-cs"/>
-                        </a:rPr>
-                        <a:t>.</a:t>
-                      </a:r>
-                    </a:p>
-                    <a:p>
-                      <a:endParaRPr lang="en-US" altLang="ko-KR" sz="1800" b="0" kern="1200">
-                        <a:solidFill>
-                          <a:schemeClr val="dk1"/>
-                        </a:solidFill>
-                        <a:effectLst/>
-                        <a:latin typeface="+mn-lt"/>
-                        <a:ea typeface="+mn-ea"/>
-                        <a:cs typeface="+mn-cs"/>
-                      </a:endParaRPr>
-                    </a:p>
-                    <a:p>
-                      <a:r>
-                        <a:rPr lang="ko-KR" altLang="en-US" sz="1800" b="0" kern="1200">
-                          <a:solidFill>
-                            <a:schemeClr val="dk1"/>
-                          </a:solidFill>
-                          <a:effectLst/>
-                          <a:latin typeface="+mn-lt"/>
-                          <a:ea typeface="+mn-ea"/>
-                          <a:cs typeface="+mn-cs"/>
-                        </a:rPr>
-                        <a:t>수신자가 상위 계층으로 데이터를 전달하기 위해</a:t>
-                      </a:r>
-                    </a:p>
-                    <a:p>
-                      <a:r>
-                        <a:rPr lang="ko-KR" altLang="en-US" sz="1800" b="0" kern="1200">
-                          <a:solidFill>
-                            <a:schemeClr val="dk1"/>
-                          </a:solidFill>
-                          <a:effectLst/>
-                          <a:latin typeface="+mn-lt"/>
-                          <a:ea typeface="+mn-ea"/>
-                          <a:cs typeface="+mn-cs"/>
-                        </a:rPr>
-                        <a:t>하나의 로직이 복수로 나눠진 패킷을 취합하기 쉽다</a:t>
-                      </a:r>
-                      <a:r>
-                        <a:rPr lang="en-US" altLang="ko-KR" sz="1800" b="0" kern="1200">
-                          <a:solidFill>
-                            <a:schemeClr val="dk1"/>
-                          </a:solidFill>
-                          <a:effectLst/>
-                          <a:latin typeface="+mn-lt"/>
-                          <a:ea typeface="+mn-ea"/>
-                          <a:cs typeface="+mn-cs"/>
-                        </a:rPr>
-                        <a:t>. </a:t>
-                      </a:r>
-                    </a:p>
-                  </a:txBody>
-                  <a:tcPr>
-                    <a:lnL w="12700" cap="flat" cmpd="sng" algn="ctr">
-                      <a:solidFill>
-                        <a:schemeClr val="tx1"/>
-                      </a:solidFill>
-                      <a:prstDash val="solid"/>
-                      <a:round/>
-                      <a:headEnd type="none" w="med" len="med"/>
-                      <a:tailEnd type="none" w="med" len="med"/>
-                    </a:lnL>
-                    <a:lnR w="12700" cap="flat" cmpd="sng" algn="ctr">
-                      <a:solidFill>
-                        <a:schemeClr val="tx1"/>
-                      </a:solidFill>
-                      <a:prstDash val="solid"/>
-                      <a:round/>
-                      <a:headEnd type="none" w="med" len="med"/>
-                      <a:tailEnd type="none" w="med" len="med"/>
-                    </a:lnR>
-                    <a:lnT w="12700" cap="flat" cmpd="sng" algn="ctr">
-                      <a:solidFill>
-                        <a:schemeClr val="tx1"/>
-                      </a:solidFill>
-                      <a:prstDash val="solid"/>
-                      <a:round/>
-                      <a:headEnd type="none" w="med" len="med"/>
-                      <a:tailEnd type="none" w="med" len="med"/>
-                    </a:lnT>
-                    <a:lnB w="12700" cap="flat" cmpd="sng" algn="ctr">
-                      <a:solidFill>
-                        <a:schemeClr val="tx1"/>
-                      </a:solidFill>
-                      <a:prstDash val="solid"/>
-                      <a:round/>
-                      <a:headEnd type="none" w="med" len="med"/>
-                      <a:tailEnd type="none" w="med" len="med"/>
-                    </a:lnB>
-                    <a:noFill/>
-                  </a:tcPr>
-                </a:tc>
-                <a:tc>
-                  <a:txBody>
-                    <a:bodyPr/>
-                    <a:lstStyle/>
-                    <a:p>
-                      <a:pPr marL="0" marR="0" lvl="0" indent="0" algn="l" defTabSz="914400" rtl="0" eaLnBrk="1" fontAlgn="auto" latinLnBrk="1" hangingPunct="1">
-                        <a:lnSpc>
-                          <a:spcPct val="100000"/>
-                        </a:lnSpc>
-                        <a:spcBef>
-                          <a:spcPts val="0"/>
-                        </a:spcBef>
-                        <a:spcAft>
-                          <a:spcPts val="0"/>
-                        </a:spcAft>
-                        <a:buClrTx/>
-                        <a:buSzTx/>
-                        <a:buFontTx/>
-                        <a:buNone/>
-                        <a:tabLst/>
-                        <a:defRPr/>
-                      </a:pPr>
-                      <a:r>
-                        <a:rPr lang="ko-KR" altLang="en-US" sz="1800" b="0" kern="1200">
-                          <a:solidFill>
-                            <a:schemeClr val="dk1"/>
-                          </a:solidFill>
-                          <a:effectLst/>
-                          <a:latin typeface="+mn-lt"/>
-                          <a:ea typeface="+mn-ea"/>
-                          <a:cs typeface="+mn-cs"/>
-                        </a:rPr>
-                        <a:t>채널 이용률을 줄인다</a:t>
-                      </a:r>
-                      <a:r>
-                        <a:rPr lang="en-US" altLang="ko-KR" sz="1800" b="0" kern="1200">
-                          <a:solidFill>
-                            <a:schemeClr val="dk1"/>
-                          </a:solidFill>
-                          <a:effectLst/>
-                          <a:latin typeface="+mn-lt"/>
-                          <a:ea typeface="+mn-ea"/>
-                          <a:cs typeface="+mn-cs"/>
-                        </a:rPr>
-                        <a:t>.</a:t>
-                      </a:r>
-                    </a:p>
-                  </a:txBody>
-                  <a:tcPr>
-                    <a:lnL w="12700" cap="flat" cmpd="sng" algn="ctr">
-                      <a:solidFill>
-                        <a:schemeClr val="tx1"/>
-                      </a:solidFill>
-                      <a:prstDash val="solid"/>
-                      <a:round/>
-                      <a:headEnd type="none" w="med" len="med"/>
-                      <a:tailEnd type="none" w="med" len="med"/>
-                    </a:lnL>
-                    <a:lnR w="12700" cap="flat" cmpd="sng" algn="ctr">
-                      <a:solidFill>
-                        <a:schemeClr val="tx1"/>
-                      </a:solidFill>
-                      <a:prstDash val="solid"/>
-                      <a:round/>
-                      <a:headEnd type="none" w="med" len="med"/>
-                      <a:tailEnd type="none" w="med" len="med"/>
-                    </a:lnR>
-                    <a:lnT w="12700" cap="flat" cmpd="sng" algn="ctr">
-                      <a:solidFill>
-                        <a:schemeClr val="tx1"/>
-                      </a:solidFill>
-                      <a:prstDash val="solid"/>
-                      <a:round/>
-                      <a:headEnd type="none" w="med" len="med"/>
-                      <a:tailEnd type="none" w="med" len="med"/>
-                    </a:lnT>
-                    <a:lnB w="12700" cap="flat" cmpd="sng" algn="ctr">
-                      <a:solidFill>
-                        <a:schemeClr val="tx1"/>
-                      </a:solidFill>
-                      <a:prstDash val="solid"/>
-                      <a:round/>
-                      <a:headEnd type="none" w="med" len="med"/>
-                      <a:tailEnd type="none" w="med" len="med"/>
-                    </a:lnB>
-                    <a:noFill/>
-                  </a:tcPr>
-                </a:tc>
-                <a:extLst>
-                  <a:ext uri="{0D108BD9-81ED-4DB2-BD59-A6C34878D82A}">
-                    <a16:rowId xmlns:a16="http://schemas.microsoft.com/office/drawing/2014/main" val="3509644011"/>
-                  </a:ext>
-                </a:extLst>
-              </a:tr>
-              <a:tr h="370840">
-                <a:tc>
-                  <a:txBody>
-                    <a:bodyPr/>
-                    <a:lstStyle/>
-                    <a:p>
-                      <a:pPr latinLnBrk="1"/>
-                      <a:r>
-                        <a:rPr lang="ko-KR" altLang="en-US">
-                          <a:solidFill>
-                            <a:schemeClr val="tx1"/>
-                          </a:solidFill>
-                        </a:rPr>
-                        <a:t>단점</a:t>
-                      </a:r>
-                    </a:p>
-                  </a:txBody>
-                  <a:tcPr anchor="ctr">
-                    <a:lnL w="12700" cap="flat" cmpd="sng" algn="ctr">
-                      <a:solidFill>
-                        <a:schemeClr val="tx1"/>
-                      </a:solidFill>
-                      <a:prstDash val="solid"/>
-                      <a:round/>
-                      <a:headEnd type="none" w="med" len="med"/>
-                      <a:tailEnd type="none" w="med" len="med"/>
-                    </a:lnL>
-                    <a:lnR w="12700" cap="flat" cmpd="sng" algn="ctr">
-                      <a:solidFill>
-                        <a:schemeClr val="tx1"/>
-                      </a:solidFill>
-                      <a:prstDash val="solid"/>
-                      <a:round/>
-                      <a:headEnd type="none" w="med" len="med"/>
-                      <a:tailEnd type="none" w="med" len="med"/>
-                    </a:lnR>
-                    <a:lnT w="12700" cap="flat" cmpd="sng" algn="ctr">
-                      <a:solidFill>
-                        <a:schemeClr val="tx1"/>
-                      </a:solidFill>
-                      <a:prstDash val="solid"/>
-                      <a:round/>
-                      <a:headEnd type="none" w="med" len="med"/>
-                      <a:tailEnd type="none" w="med" len="med"/>
-                    </a:lnT>
-                    <a:lnB w="12700" cap="flat" cmpd="sng" algn="ctr">
-                      <a:solidFill>
-                        <a:schemeClr val="tx1"/>
-                      </a:solidFill>
-                      <a:prstDash val="solid"/>
-                      <a:round/>
-                      <a:headEnd type="none" w="med" len="med"/>
-                      <a:tailEnd type="none" w="med" len="med"/>
-                    </a:lnB>
-                    <a:noFill/>
-                  </a:tcPr>
-                </a:tc>
-                <a:tc>
-                  <a:txBody>
-                    <a:bodyPr/>
-                    <a:lstStyle/>
-                    <a:p>
-                      <a:pPr marL="0" marR="0" lvl="0" indent="0" algn="l" defTabSz="914400" rtl="0" eaLnBrk="1" fontAlgn="auto" latinLnBrk="1" hangingPunct="1">
-                        <a:lnSpc>
-                          <a:spcPct val="100000"/>
-                        </a:lnSpc>
-                        <a:spcBef>
-                          <a:spcPts val="0"/>
-                        </a:spcBef>
-                        <a:spcAft>
-                          <a:spcPts val="0"/>
-                        </a:spcAft>
-                        <a:buClrTx/>
-                        <a:buSzTx/>
-                        <a:buFontTx/>
-                        <a:buNone/>
-                        <a:tabLst/>
-                        <a:defRPr/>
-                      </a:pPr>
-                      <a:r>
-                        <a:rPr lang="ko-KR" altLang="en-US" sz="1800" b="0" kern="1200">
-                          <a:solidFill>
-                            <a:schemeClr val="dk1"/>
-                          </a:solidFill>
-                          <a:effectLst/>
-                          <a:latin typeface="+mn-lt"/>
-                          <a:ea typeface="+mn-ea"/>
-                          <a:cs typeface="+mn-cs"/>
-                        </a:rPr>
-                        <a:t>재전송이 높아져 채널 이용률이 높아진다</a:t>
-                      </a:r>
-                    </a:p>
-                  </a:txBody>
-                  <a:tcPr>
-                    <a:lnL w="12700" cap="flat" cmpd="sng" algn="ctr">
-                      <a:solidFill>
-                        <a:schemeClr val="tx1"/>
-                      </a:solidFill>
-                      <a:prstDash val="solid"/>
-                      <a:round/>
-                      <a:headEnd type="none" w="med" len="med"/>
-                      <a:tailEnd type="none" w="med" len="med"/>
-                    </a:lnL>
-                    <a:lnR w="12700" cap="flat" cmpd="sng" algn="ctr">
-                      <a:solidFill>
-                        <a:schemeClr val="tx1"/>
-                      </a:solidFill>
-                      <a:prstDash val="solid"/>
-                      <a:round/>
-                      <a:headEnd type="none" w="med" len="med"/>
-                      <a:tailEnd type="none" w="med" len="med"/>
-                    </a:lnR>
-                    <a:lnT w="12700" cap="flat" cmpd="sng" algn="ctr">
-                      <a:solidFill>
-                        <a:schemeClr val="tx1"/>
-                      </a:solidFill>
-                      <a:prstDash val="solid"/>
-                      <a:round/>
-                      <a:headEnd type="none" w="med" len="med"/>
-                      <a:tailEnd type="none" w="med" len="med"/>
-                    </a:lnT>
-                    <a:lnB w="12700" cap="flat" cmpd="sng" algn="ctr">
-                      <a:solidFill>
-                        <a:schemeClr val="tx1"/>
-                      </a:solidFill>
-                      <a:prstDash val="solid"/>
-                      <a:round/>
-                      <a:headEnd type="none" w="med" len="med"/>
-                      <a:tailEnd type="none" w="med" len="med"/>
-                    </a:lnB>
-                    <a:noFill/>
-                  </a:tcPr>
-                </a:tc>
-                <a:tc>
-                  <a:txBody>
-                    <a:bodyPr/>
-                    <a:lstStyle/>
-                    <a:p>
-                      <a:pPr marL="0" marR="0" lvl="0" indent="0" algn="l" defTabSz="914400" rtl="0" eaLnBrk="1" fontAlgn="auto" latinLnBrk="1" hangingPunct="1">
-                        <a:lnSpc>
-                          <a:spcPct val="100000"/>
-                        </a:lnSpc>
-                        <a:spcBef>
-                          <a:spcPts val="0"/>
-                        </a:spcBef>
-                        <a:spcAft>
-                          <a:spcPts val="0"/>
-                        </a:spcAft>
-                        <a:buClrTx/>
-                        <a:buSzTx/>
-                        <a:buFontTx/>
-                        <a:buNone/>
-                        <a:tabLst/>
-                        <a:defRPr/>
-                      </a:pPr>
-                      <a:r>
-                        <a:rPr lang="en-US" altLang="ko-KR" sz="1800" b="0" kern="1200">
-                          <a:solidFill>
-                            <a:schemeClr val="dk1"/>
-                          </a:solidFill>
-                          <a:effectLst/>
-                          <a:latin typeface="+mn-lt"/>
-                          <a:ea typeface="+mn-ea"/>
-                          <a:cs typeface="+mn-cs"/>
-                        </a:rPr>
-                        <a:t>a. </a:t>
-                      </a:r>
-                      <a:r>
-                        <a:rPr lang="ko-KR" altLang="en-US" sz="1800" b="0" kern="1200">
-                          <a:solidFill>
-                            <a:schemeClr val="dk1"/>
-                          </a:solidFill>
-                          <a:effectLst/>
-                          <a:latin typeface="+mn-lt"/>
-                          <a:ea typeface="+mn-ea"/>
-                          <a:cs typeface="+mn-cs"/>
-                        </a:rPr>
-                        <a:t>패킷마다 타이머를 사용한다</a:t>
-                      </a:r>
-                      <a:r>
-                        <a:rPr lang="en-US" altLang="ko-KR" sz="1800" b="0" kern="1200">
-                          <a:solidFill>
-                            <a:schemeClr val="dk1"/>
-                          </a:solidFill>
-                          <a:effectLst/>
-                          <a:latin typeface="+mn-lt"/>
-                          <a:ea typeface="+mn-ea"/>
-                          <a:cs typeface="+mn-cs"/>
-                        </a:rPr>
-                        <a:t>.</a:t>
-                      </a:r>
-                    </a:p>
-                    <a:p>
-                      <a:pPr marL="0" marR="0" lvl="0" indent="0" algn="l" defTabSz="914400" rtl="0" eaLnBrk="1" fontAlgn="auto" latinLnBrk="1" hangingPunct="1">
-                        <a:lnSpc>
-                          <a:spcPct val="100000"/>
-                        </a:lnSpc>
-                        <a:spcBef>
-                          <a:spcPts val="0"/>
-                        </a:spcBef>
-                        <a:spcAft>
-                          <a:spcPts val="0"/>
-                        </a:spcAft>
-                        <a:buClrTx/>
-                        <a:buSzTx/>
-                        <a:buFontTx/>
-                        <a:buNone/>
-                        <a:tabLst/>
-                        <a:defRPr/>
-                      </a:pPr>
-                      <a:br>
-                        <a:rPr lang="en-US" altLang="ko-KR" sz="1800" b="0" kern="1200">
-                          <a:solidFill>
-                            <a:schemeClr val="dk1"/>
-                          </a:solidFill>
-                          <a:effectLst/>
-                          <a:latin typeface="+mn-lt"/>
-                          <a:ea typeface="+mn-ea"/>
-                          <a:cs typeface="+mn-cs"/>
-                        </a:rPr>
-                      </a:br>
-                      <a:r>
-                        <a:rPr lang="en-US" altLang="ko-KR" sz="1800" b="0" kern="1200">
-                          <a:solidFill>
-                            <a:schemeClr val="dk1"/>
-                          </a:solidFill>
-                          <a:effectLst/>
-                          <a:latin typeface="+mn-lt"/>
-                          <a:ea typeface="+mn-ea"/>
-                          <a:cs typeface="+mn-cs"/>
-                        </a:rPr>
-                        <a:t>b. </a:t>
-                      </a:r>
-                      <a:r>
-                        <a:rPr lang="ko-KR" altLang="en-US" sz="1800" b="0" kern="1200">
-                          <a:solidFill>
-                            <a:schemeClr val="dk1"/>
-                          </a:solidFill>
-                          <a:effectLst/>
-                          <a:latin typeface="+mn-lt"/>
-                          <a:ea typeface="+mn-ea"/>
-                          <a:cs typeface="+mn-cs"/>
-                        </a:rPr>
-                        <a:t>수신자에서 패킷을 취합하기 어렵다</a:t>
-                      </a:r>
-                      <a:r>
-                        <a:rPr lang="en-US" altLang="ko-KR" sz="1800" b="0" kern="1200">
-                          <a:solidFill>
-                            <a:schemeClr val="dk1"/>
-                          </a:solidFill>
-                          <a:effectLst/>
-                          <a:latin typeface="+mn-lt"/>
-                          <a:ea typeface="+mn-ea"/>
-                          <a:cs typeface="+mn-cs"/>
-                        </a:rPr>
-                        <a:t>.</a:t>
-                      </a:r>
-                      <a:endParaRPr lang="ko-KR" altLang="en-US" sz="1800" b="0" kern="1200">
-                        <a:solidFill>
-                          <a:schemeClr val="dk1"/>
-                        </a:solidFill>
-                        <a:effectLst/>
-                        <a:latin typeface="+mn-lt"/>
-                        <a:ea typeface="+mn-ea"/>
-                        <a:cs typeface="+mn-cs"/>
-                      </a:endParaRPr>
-                    </a:p>
-                  </a:txBody>
-                  <a:tcPr>
-                    <a:lnL w="12700" cap="flat" cmpd="sng" algn="ctr">
-                      <a:solidFill>
-                        <a:schemeClr val="tx1"/>
-                      </a:solidFill>
-                      <a:prstDash val="solid"/>
-                      <a:round/>
-                      <a:headEnd type="none" w="med" len="med"/>
-                      <a:tailEnd type="none" w="med" len="med"/>
-                    </a:lnL>
-                    <a:lnR w="12700" cap="flat" cmpd="sng" algn="ctr">
-                      <a:solidFill>
-                        <a:schemeClr val="tx1"/>
-                      </a:solidFill>
-                      <a:prstDash val="solid"/>
-                      <a:round/>
-                      <a:headEnd type="none" w="med" len="med"/>
-                      <a:tailEnd type="none" w="med" len="med"/>
-                    </a:lnR>
-                    <a:lnT w="12700" cap="flat" cmpd="sng" algn="ctr">
-                      <a:solidFill>
-                        <a:schemeClr val="tx1"/>
-                      </a:solidFill>
-                      <a:prstDash val="solid"/>
-                      <a:round/>
-                      <a:headEnd type="none" w="med" len="med"/>
-                      <a:tailEnd type="none" w="med" len="med"/>
-                    </a:lnT>
-                    <a:lnB w="12700" cap="flat" cmpd="sng" algn="ctr">
-                      <a:solidFill>
-                        <a:schemeClr val="tx1"/>
-                      </a:solidFill>
-                      <a:prstDash val="solid"/>
-                      <a:round/>
-                      <a:headEnd type="none" w="med" len="med"/>
-                      <a:tailEnd type="none" w="med" len="med"/>
-                    </a:lnB>
-                    <a:noFill/>
-                  </a:tcPr>
-                </a:tc>
-                <a:extLst>
-                  <a:ext uri="{0D108BD9-81ED-4DB2-BD59-A6C34878D82A}">
-                    <a16:rowId xmlns:a16="http://schemas.microsoft.com/office/drawing/2014/main" val="632219432"/>
-                  </a:ext>
-                </a:extLst>
-              </a:tr>
-            </a:tbl>
-          </a:graphicData>
-        </a:graphic>
-      </p:graphicFrame>
-    </p:spTree>
-    <p:extLst>
-      <p:ext uri="{BB962C8B-B14F-4D97-AF65-F5344CB8AC3E}">
-        <p14:creationId xmlns:p14="http://schemas.microsoft.com/office/powerpoint/2010/main" val="2971191391"/>
-      </p:ext>
-    </p:extLst>
-  </p:cSld>
-  <p:clrMapOvr>
-    <a:masterClrMapping/>
-  </p:clrMapOvr>
 </p:sld>
 </file>
 

</xml_diff>

<commit_message>
:speech_balloon: Add minimize packet at flow control
</commit_message>
<xml_diff>
--- a/18/yongki/FlowControl&ErrorControl.pptx
+++ b/18/yongki/FlowControl&ErrorControl.pptx
@@ -256,7 +256,7 @@
           <a:p>
             <a:fld id="{278A5395-7299-4714-9E5C-8983F2B9A6E7}" type="datetimeFigureOut">
               <a:rPr lang="ko-KR" altLang="en-US" smtClean="0"/>
-              <a:t>2022-05-13</a:t>
+              <a:t>2022-05-14</a:t>
             </a:fld>
             <a:endParaRPr lang="ko-KR" altLang="en-US"/>
           </a:p>
@@ -7509,6 +7509,84 @@
   <p:clrMapOvr>
     <a:masterClrMapping/>
   </p:clrMapOvr>
+  <p:timing>
+    <p:tnLst>
+      <p:par>
+        <p:cTn id="1" dur="indefinite" restart="never" nodeType="tmRoot">
+          <p:childTnLst>
+            <p:seq concurrent="1" nextAc="seek">
+              <p:cTn id="2" dur="indefinite" nodeType="mainSeq">
+                <p:childTnLst>
+                  <p:par>
+                    <p:cTn id="3" fill="hold">
+                      <p:stCondLst>
+                        <p:cond delay="indefinite"/>
+                      </p:stCondLst>
+                      <p:childTnLst>
+                        <p:par>
+                          <p:cTn id="4" fill="hold">
+                            <p:stCondLst>
+                              <p:cond delay="0"/>
+                            </p:stCondLst>
+                            <p:childTnLst>
+                              <p:par>
+                                <p:cTn id="5" presetID="1" presetClass="entr" presetSubtype="0" fill="hold" grpId="0" nodeType="clickEffect">
+                                  <p:stCondLst>
+                                    <p:cond delay="0"/>
+                                  </p:stCondLst>
+                                  <p:childTnLst>
+                                    <p:set>
+                                      <p:cBhvr>
+                                        <p:cTn id="6" dur="1" fill="hold">
+                                          <p:stCondLst>
+                                            <p:cond delay="0"/>
+                                          </p:stCondLst>
+                                        </p:cTn>
+                                        <p:tgtEl>
+                                          <p:spTgt spid="7"/>
+                                        </p:tgtEl>
+                                        <p:attrNameLst>
+                                          <p:attrName>style.visibility</p:attrName>
+                                        </p:attrNameLst>
+                                      </p:cBhvr>
+                                      <p:to>
+                                        <p:strVal val="visible"/>
+                                      </p:to>
+                                    </p:set>
+                                  </p:childTnLst>
+                                </p:cTn>
+                              </p:par>
+                            </p:childTnLst>
+                          </p:cTn>
+                        </p:par>
+                      </p:childTnLst>
+                    </p:cTn>
+                  </p:par>
+                </p:childTnLst>
+              </p:cTn>
+              <p:prevCondLst>
+                <p:cond evt="onPrev" delay="0">
+                  <p:tgtEl>
+                    <p:sldTgt/>
+                  </p:tgtEl>
+                </p:cond>
+              </p:prevCondLst>
+              <p:nextCondLst>
+                <p:cond evt="onNext" delay="0">
+                  <p:tgtEl>
+                    <p:sldTgt/>
+                  </p:tgtEl>
+                </p:cond>
+              </p:nextCondLst>
+            </p:seq>
+          </p:childTnLst>
+        </p:cTn>
+      </p:par>
+    </p:tnLst>
+    <p:bldLst>
+      <p:bldP spid="7" grpId="0"/>
+    </p:bldLst>
+  </p:timing>
 </p:sld>
 </file>
 
@@ -7675,7 +7753,7 @@
           <p:nvPr>
             <p:extLst>
               <p:ext uri="{D42A27DB-BD31-4B8C-83A1-F6EECF244321}">
-                <p14:modId xmlns:p14="http://schemas.microsoft.com/office/powerpoint/2010/main" val="3004335807"/>
+                <p14:modId xmlns:p14="http://schemas.microsoft.com/office/powerpoint/2010/main" val="933231508"/>
               </p:ext>
             </p:extLst>
           </p:nvPr>
@@ -7691,14 +7769,14 @@
                 <a:tableStyleId>{5C22544A-7EE6-4342-B048-85BDC9FD1C3A}</a:tableStyleId>
               </a:tblPr>
               <a:tblGrid>
-                <a:gridCol w="720080">
+                <a:gridCol w="1188132">
                   <a:extLst>
                     <a:ext uri="{9D8B030D-6E8A-4147-A177-3AD203B41FA5}">
                       <a16:colId xmlns:a16="http://schemas.microsoft.com/office/drawing/2014/main" val="1315739539"/>
                     </a:ext>
                   </a:extLst>
                 </a:gridCol>
-                <a:gridCol w="4068452">
+                <a:gridCol w="3600400">
                   <a:extLst>
                     <a:ext uri="{9D8B030D-6E8A-4147-A177-3AD203B41FA5}">
                       <a16:colId xmlns:a16="http://schemas.microsoft.com/office/drawing/2014/main" val="819310429"/>
@@ -8140,7 +8218,30 @@
                           <a:ea typeface="+mn-ea"/>
                           <a:cs typeface="+mn-cs"/>
                         </a:rPr>
-                        <a:t>손상되거나 손실된 패킷만 다시 재전송하는 기법이다</a:t>
+                        <a:t>손상되거나 손실된 패킷만 </a:t>
+                      </a:r>
+                      <a:br>
+                        <a:rPr lang="en-US" altLang="ko-KR" sz="1800" b="0" kern="1200">
+                          <a:solidFill>
+                            <a:schemeClr val="dk1"/>
+                          </a:solidFill>
+                          <a:effectLst/>
+                          <a:latin typeface="+mn-lt"/>
+                          <a:ea typeface="+mn-ea"/>
+                          <a:cs typeface="+mn-cs"/>
+                        </a:rPr>
+                      </a:br>
+                      <a:r>
+                        <a:rPr lang="ko-KR" altLang="en-US" sz="1800" b="0" kern="1200">
+                          <a:solidFill>
+                            <a:schemeClr val="dk1"/>
+                          </a:solidFill>
+                          <a:effectLst/>
+                          <a:latin typeface="+mn-lt"/>
+                          <a:ea typeface="+mn-ea"/>
+                          <a:cs typeface="+mn-cs"/>
+                        </a:rPr>
+                        <a:t>다시 재전송하는 기법이다</a:t>
                       </a:r>
                       <a:r>
                         <a:rPr lang="en-US" altLang="ko-KR" sz="1800" b="0" kern="1200">
@@ -8540,6 +8641,84 @@
   <p:clrMapOvr>
     <a:masterClrMapping/>
   </p:clrMapOvr>
+  <p:timing>
+    <p:tnLst>
+      <p:par>
+        <p:cTn id="1" dur="indefinite" restart="never" nodeType="tmRoot">
+          <p:childTnLst>
+            <p:seq concurrent="1" nextAc="seek">
+              <p:cTn id="2" dur="indefinite" nodeType="mainSeq">
+                <p:childTnLst>
+                  <p:par>
+                    <p:cTn id="3" fill="hold">
+                      <p:stCondLst>
+                        <p:cond delay="indefinite"/>
+                      </p:stCondLst>
+                      <p:childTnLst>
+                        <p:par>
+                          <p:cTn id="4" fill="hold">
+                            <p:stCondLst>
+                              <p:cond delay="0"/>
+                            </p:stCondLst>
+                            <p:childTnLst>
+                              <p:par>
+                                <p:cTn id="5" presetID="1" presetClass="entr" presetSubtype="0" fill="hold" grpId="0" nodeType="clickEffect">
+                                  <p:stCondLst>
+                                    <p:cond delay="0"/>
+                                  </p:stCondLst>
+                                  <p:childTnLst>
+                                    <p:set>
+                                      <p:cBhvr>
+                                        <p:cTn id="6" dur="1" fill="hold">
+                                          <p:stCondLst>
+                                            <p:cond delay="0"/>
+                                          </p:stCondLst>
+                                        </p:cTn>
+                                        <p:tgtEl>
+                                          <p:spTgt spid="10"/>
+                                        </p:tgtEl>
+                                        <p:attrNameLst>
+                                          <p:attrName>style.visibility</p:attrName>
+                                        </p:attrNameLst>
+                                      </p:cBhvr>
+                                      <p:to>
+                                        <p:strVal val="visible"/>
+                                      </p:to>
+                                    </p:set>
+                                  </p:childTnLst>
+                                </p:cTn>
+                              </p:par>
+                            </p:childTnLst>
+                          </p:cTn>
+                        </p:par>
+                      </p:childTnLst>
+                    </p:cTn>
+                  </p:par>
+                </p:childTnLst>
+              </p:cTn>
+              <p:prevCondLst>
+                <p:cond evt="onPrev" delay="0">
+                  <p:tgtEl>
+                    <p:sldTgt/>
+                  </p:tgtEl>
+                </p:cond>
+              </p:prevCondLst>
+              <p:nextCondLst>
+                <p:cond evt="onNext" delay="0">
+                  <p:tgtEl>
+                    <p:sldTgt/>
+                  </p:tgtEl>
+                </p:cond>
+              </p:nextCondLst>
+            </p:seq>
+          </p:childTnLst>
+        </p:cTn>
+      </p:par>
+    </p:tnLst>
+    <p:bldLst>
+      <p:bldP spid="10" grpId="0"/>
+    </p:bldLst>
+  </p:timing>
 </p:sld>
 </file>
 
@@ -18140,7 +18319,7 @@
                   <a:schemeClr val="tx1"/>
                 </a:solidFill>
               </a:rPr>
-              <a:t>신뢰성 있는 데이터 전송의 원리</a:t>
+              <a:t>하위 계층에 따른 신뢰성 작업</a:t>
             </a:r>
             <a:endParaRPr lang="ko-KR" altLang="ko-KR" sz="2000">
               <a:solidFill>
@@ -18213,7 +18392,7 @@
         <p:spPr bwMode="auto">
           <a:xfrm>
             <a:off x="565684" y="1402138"/>
-            <a:ext cx="8229600" cy="307777"/>
+            <a:ext cx="8229600" cy="738664"/>
           </a:xfrm>
           <a:prstGeom prst="rect">
             <a:avLst/>
@@ -18393,6 +18572,34 @@
               </a:spcBef>
               <a:buNone/>
             </a:pPr>
+            <a:r>
+              <a:rPr lang="ko-KR" altLang="en-US" sz="1400" b="1">
+                <a:solidFill>
+                  <a:srgbClr val="000000"/>
+                </a:solidFill>
+                <a:latin typeface="맑은 고딕" panose="020B0503020000020004" pitchFamily="50" charset="-127"/>
+                <a:ea typeface="맑은 고딕" panose="020B0503020000020004" pitchFamily="50" charset="-127"/>
+              </a:rPr>
+              <a:t>신뢰성 있는 데이터 전송의 원리란</a:t>
+            </a:r>
+            <a:br>
+              <a:rPr lang="en-US" altLang="ko-KR" sz="1400">
+                <a:solidFill>
+                  <a:srgbClr val="000000"/>
+                </a:solidFill>
+                <a:latin typeface="맑은 고딕" panose="020B0503020000020004" pitchFamily="50" charset="-127"/>
+                <a:ea typeface="맑은 고딕" panose="020B0503020000020004" pitchFamily="50" charset="-127"/>
+              </a:rPr>
+            </a:br>
+            <a:br>
+              <a:rPr lang="en-US" altLang="ko-KR" sz="1400">
+                <a:solidFill>
+                  <a:srgbClr val="000000"/>
+                </a:solidFill>
+                <a:latin typeface="맑은 고딕" panose="020B0503020000020004" pitchFamily="50" charset="-127"/>
+                <a:ea typeface="맑은 고딕" panose="020B0503020000020004" pitchFamily="50" charset="-127"/>
+              </a:rPr>
+            </a:br>
             <a:r>
               <a:rPr lang="ko-KR" altLang="en-US" sz="1400">
                 <a:solidFill>
@@ -18452,7 +18659,7 @@
         </p:nvSpPr>
         <p:spPr bwMode="auto">
           <a:xfrm>
-            <a:off x="565684" y="1843292"/>
+            <a:off x="565684" y="2274179"/>
             <a:ext cx="8229600" cy="738664"/>
           </a:xfrm>
           <a:prstGeom prst="rect">
@@ -18698,7 +18905,7 @@
         </p:nvGrpSpPr>
         <p:grpSpPr>
           <a:xfrm>
-            <a:off x="3131840" y="2789339"/>
+            <a:off x="6516216" y="2682295"/>
             <a:ext cx="2555776" cy="4068661"/>
             <a:chOff x="0" y="2789339"/>
             <a:chExt cx="2555776" cy="4068661"/>
@@ -18802,6 +19009,81 @@
   <p:clrMapOvr>
     <a:masterClrMapping/>
   </p:clrMapOvr>
+  <p:timing>
+    <p:tnLst>
+      <p:par>
+        <p:cTn id="1" dur="indefinite" restart="never" nodeType="tmRoot">
+          <p:childTnLst>
+            <p:seq concurrent="1" nextAc="seek">
+              <p:cTn id="2" dur="indefinite" nodeType="mainSeq">
+                <p:childTnLst>
+                  <p:par>
+                    <p:cTn id="3" fill="hold">
+                      <p:stCondLst>
+                        <p:cond delay="indefinite"/>
+                      </p:stCondLst>
+                      <p:childTnLst>
+                        <p:par>
+                          <p:cTn id="4" fill="hold">
+                            <p:stCondLst>
+                              <p:cond delay="0"/>
+                            </p:stCondLst>
+                            <p:childTnLst>
+                              <p:par>
+                                <p:cTn id="5" presetID="1" presetClass="entr" presetSubtype="0" fill="hold" nodeType="clickEffect">
+                                  <p:stCondLst>
+                                    <p:cond delay="0"/>
+                                  </p:stCondLst>
+                                  <p:childTnLst>
+                                    <p:set>
+                                      <p:cBhvr>
+                                        <p:cTn id="6" dur="1" fill="hold">
+                                          <p:stCondLst>
+                                            <p:cond delay="0"/>
+                                          </p:stCondLst>
+                                        </p:cTn>
+                                        <p:tgtEl>
+                                          <p:spTgt spid="2"/>
+                                        </p:tgtEl>
+                                        <p:attrNameLst>
+                                          <p:attrName>style.visibility</p:attrName>
+                                        </p:attrNameLst>
+                                      </p:cBhvr>
+                                      <p:to>
+                                        <p:strVal val="visible"/>
+                                      </p:to>
+                                    </p:set>
+                                  </p:childTnLst>
+                                </p:cTn>
+                              </p:par>
+                            </p:childTnLst>
+                          </p:cTn>
+                        </p:par>
+                      </p:childTnLst>
+                    </p:cTn>
+                  </p:par>
+                </p:childTnLst>
+              </p:cTn>
+              <p:prevCondLst>
+                <p:cond evt="onPrev" delay="0">
+                  <p:tgtEl>
+                    <p:sldTgt/>
+                  </p:tgtEl>
+                </p:cond>
+              </p:prevCondLst>
+              <p:nextCondLst>
+                <p:cond evt="onNext" delay="0">
+                  <p:tgtEl>
+                    <p:sldTgt/>
+                  </p:tgtEl>
+                </p:cond>
+              </p:nextCondLst>
+            </p:seq>
+          </p:childTnLst>
+        </p:cTn>
+      </p:par>
+    </p:tnLst>
+  </p:timing>
 </p:sld>
 </file>
 
@@ -18857,7 +19139,7 @@
                   <a:schemeClr val="tx1"/>
                 </a:solidFill>
               </a:rPr>
-              <a:t>신뢰성 있는 데이터 전송의 원리</a:t>
+              <a:t>하위 계층에 따른 신뢰성 작업</a:t>
             </a:r>
             <a:endParaRPr lang="ko-KR" altLang="ko-KR" sz="2000">
               <a:solidFill>
@@ -20582,6 +20864,78 @@
                                           </p:stCondLst>
                                         </p:cTn>
                                         <p:tgtEl>
+                                          <p:spTgt spid="8"/>
+                                        </p:tgtEl>
+                                        <p:attrNameLst>
+                                          <p:attrName>style.visibility</p:attrName>
+                                        </p:attrNameLst>
+                                      </p:cBhvr>
+                                      <p:to>
+                                        <p:strVal val="visible"/>
+                                      </p:to>
+                                    </p:set>
+                                  </p:childTnLst>
+                                </p:cTn>
+                              </p:par>
+                              <p:par>
+                                <p:cTn id="7" presetID="1" presetClass="entr" presetSubtype="0" fill="hold" nodeType="withEffect">
+                                  <p:stCondLst>
+                                    <p:cond delay="0"/>
+                                  </p:stCondLst>
+                                  <p:childTnLst>
+                                    <p:set>
+                                      <p:cBhvr>
+                                        <p:cTn id="8" dur="1" fill="hold">
+                                          <p:stCondLst>
+                                            <p:cond delay="0"/>
+                                          </p:stCondLst>
+                                        </p:cTn>
+                                        <p:tgtEl>
+                                          <p:spTgt spid="7"/>
+                                        </p:tgtEl>
+                                        <p:attrNameLst>
+                                          <p:attrName>style.visibility</p:attrName>
+                                        </p:attrNameLst>
+                                      </p:cBhvr>
+                                      <p:to>
+                                        <p:strVal val="visible"/>
+                                      </p:to>
+                                    </p:set>
+                                  </p:childTnLst>
+                                </p:cTn>
+                              </p:par>
+                            </p:childTnLst>
+                          </p:cTn>
+                        </p:par>
+                      </p:childTnLst>
+                    </p:cTn>
+                  </p:par>
+                  <p:par>
+                    <p:cTn id="9" fill="hold">
+                      <p:stCondLst>
+                        <p:cond delay="indefinite"/>
+                      </p:stCondLst>
+                      <p:childTnLst>
+                        <p:par>
+                          <p:cTn id="10" fill="hold">
+                            <p:stCondLst>
+                              <p:cond delay="0"/>
+                            </p:stCondLst>
+                            <p:childTnLst>
+                              <p:par>
+                                <p:cTn id="11" presetID="1" presetClass="entr" presetSubtype="0" fill="hold" grpId="0" nodeType="clickEffect">
+                                  <p:stCondLst>
+                                    <p:cond delay="0"/>
+                                  </p:stCondLst>
+                                  <p:childTnLst>
+                                    <p:set>
+                                      <p:cBhvr>
+                                        <p:cTn id="12" dur="1" fill="hold">
+                                          <p:stCondLst>
+                                            <p:cond delay="0"/>
+                                          </p:stCondLst>
+                                        </p:cTn>
+                                        <p:tgtEl>
                                           <p:spTgt spid="9"/>
                                         </p:tgtEl>
                                         <p:attrNameLst>
@@ -20623,6 +20977,7 @@
       </p:par>
     </p:tnLst>
     <p:bldLst>
+      <p:bldP spid="8" grpId="0"/>
       <p:bldP spid="9" grpId="0"/>
     </p:bldLst>
   </p:timing>

</xml_diff>